<commit_message>
Update slides and Qualtrics file
</commit_message>
<xml_diff>
--- a/slides.pptx
+++ b/slides.pptx
@@ -13,12 +13,12 @@
     <p:sldId id="261" r:id="rId7"/>
     <p:sldId id="262" r:id="rId8"/>
     <p:sldId id="263" r:id="rId9"/>
-    <p:sldId id="290" r:id="rId10"/>
-    <p:sldId id="264" r:id="rId11"/>
-    <p:sldId id="267" r:id="rId12"/>
-    <p:sldId id="269" r:id="rId13"/>
-    <p:sldId id="270" r:id="rId14"/>
-    <p:sldId id="271" r:id="rId15"/>
+    <p:sldId id="264" r:id="rId10"/>
+    <p:sldId id="267" r:id="rId11"/>
+    <p:sldId id="269" r:id="rId12"/>
+    <p:sldId id="270" r:id="rId13"/>
+    <p:sldId id="271" r:id="rId14"/>
+    <p:sldId id="292" r:id="rId15"/>
     <p:sldId id="272" r:id="rId16"/>
     <p:sldId id="273" r:id="rId17"/>
     <p:sldId id="274" r:id="rId18"/>
@@ -3435,7 +3435,7 @@
           <a:p>
             <a:fld id="{02AC24A9-CCB6-4F8D-B8DB-C2F3692CFA5A}" type="datetimeFigureOut">
               <a:rPr lang="en-US" smtClean="0"/>
-              <a:t>3/31/2022</a:t>
+              <a:t>4/6/2022</a:t>
             </a:fld>
             <a:endParaRPr lang="en-US" dirty="0"/>
           </a:p>
@@ -3805,7 +3805,7 @@
           <a:p>
             <a:fld id="{02AC24A9-CCB6-4F8D-B8DB-C2F3692CFA5A}" type="datetimeFigureOut">
               <a:rPr lang="en-US" smtClean="0"/>
-              <a:t>3/31/2022</a:t>
+              <a:t>4/6/2022</a:t>
             </a:fld>
             <a:endParaRPr lang="en-US"/>
           </a:p>
@@ -4014,7 +4014,7 @@
           <a:p>
             <a:fld id="{02AC24A9-CCB6-4F8D-B8DB-C2F3692CFA5A}" type="datetimeFigureOut">
               <a:rPr lang="en-US" smtClean="0"/>
-              <a:t>3/31/2022</a:t>
+              <a:t>4/6/2022</a:t>
             </a:fld>
             <a:endParaRPr lang="en-US"/>
           </a:p>
@@ -4484,7 +4484,7 @@
           <a:p>
             <a:fld id="{02AC24A9-CCB6-4F8D-B8DB-C2F3692CFA5A}" type="datetimeFigureOut">
               <a:rPr lang="en-US" smtClean="0"/>
-              <a:t>3/31/2022</a:t>
+              <a:t>4/6/2022</a:t>
             </a:fld>
             <a:endParaRPr lang="en-US"/>
           </a:p>
@@ -4938,7 +4938,7 @@
           <a:p>
             <a:fld id="{02AC24A9-CCB6-4F8D-B8DB-C2F3692CFA5A}" type="datetimeFigureOut">
               <a:rPr lang="en-US" smtClean="0"/>
-              <a:t>3/31/2022</a:t>
+              <a:t>4/6/2022</a:t>
             </a:fld>
             <a:endParaRPr lang="en-US"/>
           </a:p>
@@ -5470,7 +5470,7 @@
           <a:p>
             <a:fld id="{02AC24A9-CCB6-4F8D-B8DB-C2F3692CFA5A}" type="datetimeFigureOut">
               <a:rPr lang="en-US" smtClean="0"/>
-              <a:t>3/31/2022</a:t>
+              <a:t>4/6/2022</a:t>
             </a:fld>
             <a:endParaRPr lang="en-US"/>
           </a:p>
@@ -6169,7 +6169,7 @@
           <a:p>
             <a:fld id="{02AC24A9-CCB6-4F8D-B8DB-C2F3692CFA5A}" type="datetimeFigureOut">
               <a:rPr lang="en-US" smtClean="0"/>
-              <a:t>3/31/2022</a:t>
+              <a:t>4/6/2022</a:t>
             </a:fld>
             <a:endParaRPr lang="en-US"/>
           </a:p>
@@ -6498,7 +6498,7 @@
           <a:p>
             <a:fld id="{02AC24A9-CCB6-4F8D-B8DB-C2F3692CFA5A}" type="datetimeFigureOut">
               <a:rPr lang="en-US" smtClean="0"/>
-              <a:t>3/31/2022</a:t>
+              <a:t>4/6/2022</a:t>
             </a:fld>
             <a:endParaRPr lang="en-US"/>
           </a:p>
@@ -6611,7 +6611,7 @@
           <a:p>
             <a:fld id="{02AC24A9-CCB6-4F8D-B8DB-C2F3692CFA5A}" type="datetimeFigureOut">
               <a:rPr lang="en-US" smtClean="0"/>
-              <a:t>3/31/2022</a:t>
+              <a:t>4/6/2022</a:t>
             </a:fld>
             <a:endParaRPr lang="en-US"/>
           </a:p>
@@ -7106,7 +7106,7 @@
           <a:p>
             <a:fld id="{02AC24A9-CCB6-4F8D-B8DB-C2F3692CFA5A}" type="datetimeFigureOut">
               <a:rPr lang="en-US" smtClean="0"/>
-              <a:t>3/31/2022</a:t>
+              <a:t>4/6/2022</a:t>
             </a:fld>
             <a:endParaRPr lang="en-US" dirty="0"/>
           </a:p>
@@ -7583,7 +7583,7 @@
           <a:p>
             <a:fld id="{02AC24A9-CCB6-4F8D-B8DB-C2F3692CFA5A}" type="datetimeFigureOut">
               <a:rPr lang="en-US" smtClean="0"/>
-              <a:t>3/31/2022</a:t>
+              <a:t>4/6/2022</a:t>
             </a:fld>
             <a:endParaRPr lang="en-US"/>
           </a:p>
@@ -7856,7 +7856,7 @@
           <a:p>
             <a:fld id="{02AC24A9-CCB6-4F8D-B8DB-C2F3692CFA5A}" type="datetimeFigureOut">
               <a:rPr lang="en-US" smtClean="0"/>
-              <a:t>3/31/2022</a:t>
+              <a:t>4/6/2022</a:t>
             </a:fld>
             <a:endParaRPr lang="en-US"/>
           </a:p>
@@ -8643,772 +8643,6 @@
 <file path=ppt/slides/slide10.xml><?xml version="1.0" encoding="utf-8"?>
 <p:sld xmlns:a="http://schemas.openxmlformats.org/drawingml/2006/main" xmlns:r="http://schemas.openxmlformats.org/officeDocument/2006/relationships" xmlns:p="http://schemas.openxmlformats.org/presentationml/2006/main">
   <p:cSld>
-    <p:spTree>
-      <p:nvGrpSpPr>
-        <p:cNvPr id="1" name=""/>
-        <p:cNvGrpSpPr/>
-        <p:nvPr/>
-      </p:nvGrpSpPr>
-      <p:grpSpPr>
-        <a:xfrm>
-          <a:off x="0" y="0"/>
-          <a:ext cx="0" cy="0"/>
-          <a:chOff x="0" y="0"/>
-          <a:chExt cx="0" cy="0"/>
-        </a:xfrm>
-      </p:grpSpPr>
-      <p:sp useBgFill="1">
-        <p:nvSpPr>
-          <p:cNvPr id="13" name="Rectangle 12">
-            <a:extLst>
-              <a:ext uri="{FF2B5EF4-FFF2-40B4-BE49-F238E27FC236}">
-                <a16:creationId xmlns:a16="http://schemas.microsoft.com/office/drawing/2014/main" id="{115719BB-48A7-4AF4-BB91-DC82E0DF727D}"/>
-              </a:ext>
-              <a:ext uri="{C183D7F6-B498-43B3-948B-1728B52AA6E4}">
-                <adec:decorative xmlns:adec="http://schemas.microsoft.com/office/drawing/2017/decorative" val="1"/>
-              </a:ext>
-            </a:extLst>
-          </p:cNvPr>
-          <p:cNvSpPr>
-            <a:spLocks noGrp="1" noRot="1" noChangeAspect="1" noMove="1" noResize="1" noEditPoints="1" noAdjustHandles="1" noChangeArrowheads="1" noChangeShapeType="1" noTextEdit="1"/>
-          </p:cNvSpPr>
-          <p:nvPr>
-            <p:extLst>
-              <p:ext uri="{386F3935-93C4-4BCD-93E2-E3B085C9AB24}">
-                <p16:designElem xmlns:p16="http://schemas.microsoft.com/office/powerpoint/2015/main" val="1"/>
-              </p:ext>
-            </p:extLst>
-          </p:nvPr>
-        </p:nvSpPr>
-        <p:spPr>
-          <a:xfrm>
-            <a:off x="0" y="0"/>
-            <a:ext cx="12192000" cy="6858000"/>
-          </a:xfrm>
-          <a:prstGeom prst="rect">
-            <a:avLst/>
-          </a:prstGeom>
-          <a:ln>
-            <a:noFill/>
-          </a:ln>
-        </p:spPr>
-        <p:style>
-          <a:lnRef idx="2">
-            <a:schemeClr val="accent1">
-              <a:shade val="50000"/>
-            </a:schemeClr>
-          </a:lnRef>
-          <a:fillRef idx="1">
-            <a:schemeClr val="accent1"/>
-          </a:fillRef>
-          <a:effectRef idx="0">
-            <a:schemeClr val="accent1"/>
-          </a:effectRef>
-          <a:fontRef idx="minor">
-            <a:schemeClr val="lt1"/>
-          </a:fontRef>
-        </p:style>
-        <p:txBody>
-          <a:bodyPr rtlCol="0" anchor="ctr"/>
-          <a:lstStyle/>
-          <a:p>
-            <a:pPr algn="ctr"/>
-            <a:endParaRPr lang="en-US"/>
-          </a:p>
-        </p:txBody>
-      </p:sp>
-      <p:sp useBgFill="1">
-        <p:nvSpPr>
-          <p:cNvPr id="15" name="Freeform: Shape 14">
-            <a:extLst>
-              <a:ext uri="{FF2B5EF4-FFF2-40B4-BE49-F238E27FC236}">
-                <a16:creationId xmlns:a16="http://schemas.microsoft.com/office/drawing/2014/main" id="{10973A55-5440-4A99-B526-B5812E46271E}"/>
-              </a:ext>
-              <a:ext uri="{C183D7F6-B498-43B3-948B-1728B52AA6E4}">
-                <adec:decorative xmlns:adec="http://schemas.microsoft.com/office/drawing/2017/decorative" val="1"/>
-              </a:ext>
-            </a:extLst>
-          </p:cNvPr>
-          <p:cNvSpPr>
-            <a:spLocks noGrp="1" noRot="1" noChangeAspect="1" noMove="1" noResize="1" noEditPoints="1" noAdjustHandles="1" noChangeArrowheads="1" noChangeShapeType="1" noTextEdit="1"/>
-          </p:cNvSpPr>
-          <p:nvPr>
-            <p:extLst>
-              <p:ext uri="{386F3935-93C4-4BCD-93E2-E3B085C9AB24}">
-                <p16:designElem xmlns:p16="http://schemas.microsoft.com/office/powerpoint/2015/main" val="1"/>
-              </p:ext>
-            </p:extLst>
-          </p:nvPr>
-        </p:nvSpPr>
-        <p:spPr>
-          <a:xfrm>
-            <a:off x="-1" y="0"/>
-            <a:ext cx="6096002" cy="6858000"/>
-          </a:xfrm>
-          <a:custGeom>
-            <a:avLst/>
-            <a:gdLst>
-              <a:gd name="connsiteX0" fmla="*/ 0 w 6096002"/>
-              <a:gd name="connsiteY0" fmla="*/ 0 h 6858000"/>
-              <a:gd name="connsiteX1" fmla="*/ 4885967 w 6096002"/>
-              <a:gd name="connsiteY1" fmla="*/ 0 h 6858000"/>
-              <a:gd name="connsiteX2" fmla="*/ 4946007 w 6096002"/>
-              <a:gd name="connsiteY2" fmla="*/ 69271 h 6858000"/>
-              <a:gd name="connsiteX3" fmla="*/ 6096002 w 6096002"/>
-              <a:gd name="connsiteY3" fmla="*/ 3429000 h 6858000"/>
-              <a:gd name="connsiteX4" fmla="*/ 4946007 w 6096002"/>
-              <a:gd name="connsiteY4" fmla="*/ 6788730 h 6858000"/>
-              <a:gd name="connsiteX5" fmla="*/ 4885967 w 6096002"/>
-              <a:gd name="connsiteY5" fmla="*/ 6858000 h 6858000"/>
-              <a:gd name="connsiteX6" fmla="*/ 0 w 6096002"/>
-              <a:gd name="connsiteY6" fmla="*/ 6858000 h 6858000"/>
-            </a:gdLst>
-            <a:ahLst/>
-            <a:cxnLst>
-              <a:cxn ang="0">
-                <a:pos x="connsiteX0" y="connsiteY0"/>
-              </a:cxn>
-              <a:cxn ang="0">
-                <a:pos x="connsiteX1" y="connsiteY1"/>
-              </a:cxn>
-              <a:cxn ang="0">
-                <a:pos x="connsiteX2" y="connsiteY2"/>
-              </a:cxn>
-              <a:cxn ang="0">
-                <a:pos x="connsiteX3" y="connsiteY3"/>
-              </a:cxn>
-              <a:cxn ang="0">
-                <a:pos x="connsiteX4" y="connsiteY4"/>
-              </a:cxn>
-              <a:cxn ang="0">
-                <a:pos x="connsiteX5" y="connsiteY5"/>
-              </a:cxn>
-              <a:cxn ang="0">
-                <a:pos x="connsiteX6" y="connsiteY6"/>
-              </a:cxn>
-            </a:cxnLst>
-            <a:rect l="l" t="t" r="r" b="b"/>
-            <a:pathLst>
-              <a:path w="6096002" h="6858000">
-                <a:moveTo>
-                  <a:pt x="0" y="0"/>
-                </a:moveTo>
-                <a:lnTo>
-                  <a:pt x="4885967" y="0"/>
-                </a:lnTo>
-                <a:lnTo>
-                  <a:pt x="4946007" y="69271"/>
-                </a:lnTo>
-                <a:cubicBezTo>
-                  <a:pt x="5656533" y="929100"/>
-                  <a:pt x="6096002" y="2116944"/>
-                  <a:pt x="6096002" y="3429000"/>
-                </a:cubicBezTo>
-                <a:cubicBezTo>
-                  <a:pt x="6096002" y="4741056"/>
-                  <a:pt x="5656533" y="5928900"/>
-                  <a:pt x="4946007" y="6788730"/>
-                </a:cubicBezTo>
-                <a:lnTo>
-                  <a:pt x="4885967" y="6858000"/>
-                </a:lnTo>
-                <a:lnTo>
-                  <a:pt x="0" y="6858000"/>
-                </a:lnTo>
-                <a:close/>
-              </a:path>
-            </a:pathLst>
-          </a:custGeom>
-          <a:ln w="9525">
-            <a:solidFill>
-              <a:schemeClr val="tx2">
-                <a:lumMod val="10000"/>
-                <a:lumOff val="90000"/>
-              </a:schemeClr>
-            </a:solidFill>
-          </a:ln>
-          <a:effectLst>
-            <a:outerShdw blurRad="50800" dist="38100" algn="l" rotWithShape="0">
-              <a:schemeClr val="bg1">
-                <a:lumMod val="85000"/>
-                <a:alpha val="30000"/>
-              </a:schemeClr>
-            </a:outerShdw>
-          </a:effectLst>
-        </p:spPr>
-        <p:style>
-          <a:lnRef idx="2">
-            <a:schemeClr val="accent1">
-              <a:shade val="50000"/>
-            </a:schemeClr>
-          </a:lnRef>
-          <a:fillRef idx="1">
-            <a:schemeClr val="accent1"/>
-          </a:fillRef>
-          <a:effectRef idx="0">
-            <a:schemeClr val="accent1"/>
-          </a:effectRef>
-          <a:fontRef idx="minor">
-            <a:schemeClr val="lt1"/>
-          </a:fontRef>
-        </p:style>
-        <p:txBody>
-          <a:bodyPr wrap="square" rtlCol="0" anchor="ctr">
-            <a:noAutofit/>
-          </a:bodyPr>
-          <a:lstStyle/>
-          <a:p>
-            <a:pPr marL="0" marR="0" lvl="0" indent="0" algn="ctr" defTabSz="914400" rtl="0" eaLnBrk="1" fontAlgn="auto" latinLnBrk="0" hangingPunct="1">
-              <a:lnSpc>
-                <a:spcPct val="100000"/>
-              </a:lnSpc>
-              <a:spcBef>
-                <a:spcPts val="0"/>
-              </a:spcBef>
-              <a:spcAft>
-                <a:spcPts val="0"/>
-              </a:spcAft>
-              <a:buClrTx/>
-              <a:buSzTx/>
-              <a:buFontTx/>
-              <a:buNone/>
-              <a:tabLst/>
-              <a:defRPr/>
-            </a:pPr>
-            <a:endParaRPr kumimoji="0" lang="en-US" sz="1800" b="0" i="0" u="none" strike="noStrike" kern="1200" cap="none" spc="0" normalizeH="0" baseline="0" noProof="0">
-              <a:ln>
-                <a:noFill/>
-              </a:ln>
-              <a:solidFill>
-                <a:prstClr val="white"/>
-              </a:solidFill>
-              <a:effectLst/>
-              <a:uLnTx/>
-              <a:uFillTx/>
-              <a:latin typeface="Calibri" panose="020F0502020204030204"/>
-              <a:ea typeface="+mn-ea"/>
-              <a:cs typeface="+mn-cs"/>
-            </a:endParaRPr>
-          </a:p>
-        </p:txBody>
-      </p:sp>
-      <p:sp useBgFill="1">
-        <p:nvSpPr>
-          <p:cNvPr id="17" name="Freeform: Shape 16">
-            <a:extLst>
-              <a:ext uri="{FF2B5EF4-FFF2-40B4-BE49-F238E27FC236}">
-                <a16:creationId xmlns:a16="http://schemas.microsoft.com/office/drawing/2014/main" id="{A9682493-588A-4D52-98F6-FBBD80C07ECB}"/>
-              </a:ext>
-              <a:ext uri="{C183D7F6-B498-43B3-948B-1728B52AA6E4}">
-                <adec:decorative xmlns:adec="http://schemas.microsoft.com/office/drawing/2017/decorative" val="1"/>
-              </a:ext>
-            </a:extLst>
-          </p:cNvPr>
-          <p:cNvSpPr>
-            <a:spLocks noGrp="1" noRot="1" noChangeAspect="1" noMove="1" noResize="1" noEditPoints="1" noAdjustHandles="1" noChangeArrowheads="1" noChangeShapeType="1" noTextEdit="1"/>
-          </p:cNvSpPr>
-          <p:nvPr>
-            <p:extLst>
-              <p:ext uri="{386F3935-93C4-4BCD-93E2-E3B085C9AB24}">
-                <p16:designElem xmlns:p16="http://schemas.microsoft.com/office/powerpoint/2015/main" val="1"/>
-              </p:ext>
-            </p:extLst>
-          </p:nvPr>
-        </p:nvSpPr>
-        <p:spPr>
-          <a:xfrm>
-            <a:off x="0" y="0"/>
-            <a:ext cx="6085370" cy="6858000"/>
-          </a:xfrm>
-          <a:custGeom>
-            <a:avLst/>
-            <a:gdLst>
-              <a:gd name="connsiteX0" fmla="*/ 0 w 6085370"/>
-              <a:gd name="connsiteY0" fmla="*/ 0 h 6858000"/>
-              <a:gd name="connsiteX1" fmla="*/ 4875335 w 6085370"/>
-              <a:gd name="connsiteY1" fmla="*/ 0 h 6858000"/>
-              <a:gd name="connsiteX2" fmla="*/ 4935375 w 6085370"/>
-              <a:gd name="connsiteY2" fmla="*/ 69271 h 6858000"/>
-              <a:gd name="connsiteX3" fmla="*/ 6085370 w 6085370"/>
-              <a:gd name="connsiteY3" fmla="*/ 3429000 h 6858000"/>
-              <a:gd name="connsiteX4" fmla="*/ 4935375 w 6085370"/>
-              <a:gd name="connsiteY4" fmla="*/ 6788730 h 6858000"/>
-              <a:gd name="connsiteX5" fmla="*/ 4875335 w 6085370"/>
-              <a:gd name="connsiteY5" fmla="*/ 6858000 h 6858000"/>
-              <a:gd name="connsiteX6" fmla="*/ 0 w 6085370"/>
-              <a:gd name="connsiteY6" fmla="*/ 6858000 h 6858000"/>
-            </a:gdLst>
-            <a:ahLst/>
-            <a:cxnLst>
-              <a:cxn ang="0">
-                <a:pos x="connsiteX0" y="connsiteY0"/>
-              </a:cxn>
-              <a:cxn ang="0">
-                <a:pos x="connsiteX1" y="connsiteY1"/>
-              </a:cxn>
-              <a:cxn ang="0">
-                <a:pos x="connsiteX2" y="connsiteY2"/>
-              </a:cxn>
-              <a:cxn ang="0">
-                <a:pos x="connsiteX3" y="connsiteY3"/>
-              </a:cxn>
-              <a:cxn ang="0">
-                <a:pos x="connsiteX4" y="connsiteY4"/>
-              </a:cxn>
-              <a:cxn ang="0">
-                <a:pos x="connsiteX5" y="connsiteY5"/>
-              </a:cxn>
-              <a:cxn ang="0">
-                <a:pos x="connsiteX6" y="connsiteY6"/>
-              </a:cxn>
-            </a:cxnLst>
-            <a:rect l="l" t="t" r="r" b="b"/>
-            <a:pathLst>
-              <a:path w="6085370" h="6858000">
-                <a:moveTo>
-                  <a:pt x="0" y="0"/>
-                </a:moveTo>
-                <a:lnTo>
-                  <a:pt x="4875335" y="0"/>
-                </a:lnTo>
-                <a:lnTo>
-                  <a:pt x="4935375" y="69271"/>
-                </a:lnTo>
-                <a:cubicBezTo>
-                  <a:pt x="5645901" y="929100"/>
-                  <a:pt x="6085370" y="2116944"/>
-                  <a:pt x="6085370" y="3429000"/>
-                </a:cubicBezTo>
-                <a:cubicBezTo>
-                  <a:pt x="6085370" y="4741056"/>
-                  <a:pt x="5645901" y="5928900"/>
-                  <a:pt x="4935375" y="6788730"/>
-                </a:cubicBezTo>
-                <a:lnTo>
-                  <a:pt x="4875335" y="6858000"/>
-                </a:lnTo>
-                <a:lnTo>
-                  <a:pt x="0" y="6858000"/>
-                </a:lnTo>
-                <a:close/>
-              </a:path>
-            </a:pathLst>
-          </a:custGeom>
-          <a:ln w="9525">
-            <a:noFill/>
-          </a:ln>
-          <a:effectLst/>
-        </p:spPr>
-        <p:style>
-          <a:lnRef idx="2">
-            <a:schemeClr val="accent1">
-              <a:shade val="50000"/>
-            </a:schemeClr>
-          </a:lnRef>
-          <a:fillRef idx="1">
-            <a:schemeClr val="accent1"/>
-          </a:fillRef>
-          <a:effectRef idx="0">
-            <a:schemeClr val="accent1"/>
-          </a:effectRef>
-          <a:fontRef idx="minor">
-            <a:schemeClr val="lt1"/>
-          </a:fontRef>
-        </p:style>
-        <p:txBody>
-          <a:bodyPr wrap="square" rtlCol="0" anchor="ctr">
-            <a:noAutofit/>
-          </a:bodyPr>
-          <a:lstStyle/>
-          <a:p>
-            <a:pPr marL="0" marR="0" lvl="0" indent="0" algn="ctr" defTabSz="914400" rtl="0" eaLnBrk="1" fontAlgn="auto" latinLnBrk="0" hangingPunct="1">
-              <a:lnSpc>
-                <a:spcPct val="100000"/>
-              </a:lnSpc>
-              <a:spcBef>
-                <a:spcPts val="0"/>
-              </a:spcBef>
-              <a:spcAft>
-                <a:spcPts val="0"/>
-              </a:spcAft>
-              <a:buClrTx/>
-              <a:buSzTx/>
-              <a:buFontTx/>
-              <a:buNone/>
-              <a:tabLst/>
-              <a:defRPr/>
-            </a:pPr>
-            <a:endParaRPr kumimoji="0" lang="en-US" sz="1800" b="0" i="0" u="none" strike="noStrike" kern="1200" cap="none" spc="0" normalizeH="0" baseline="0" noProof="0">
-              <a:ln>
-                <a:noFill/>
-              </a:ln>
-              <a:solidFill>
-                <a:prstClr val="white"/>
-              </a:solidFill>
-              <a:effectLst/>
-              <a:uLnTx/>
-              <a:uFillTx/>
-              <a:latin typeface="Calibri" panose="020F0502020204030204"/>
-              <a:ea typeface="+mn-ea"/>
-              <a:cs typeface="+mn-cs"/>
-            </a:endParaRPr>
-          </a:p>
-        </p:txBody>
-      </p:sp>
-      <p:sp>
-        <p:nvSpPr>
-          <p:cNvPr id="2" name="標題 1">
-            <a:extLst>
-              <a:ext uri="{FF2B5EF4-FFF2-40B4-BE49-F238E27FC236}">
-                <a16:creationId xmlns:a16="http://schemas.microsoft.com/office/drawing/2014/main" id="{3BB560C3-C9BD-4617-B54B-6E716152B1C4}"/>
-              </a:ext>
-            </a:extLst>
-          </p:cNvPr>
-          <p:cNvSpPr>
-            <a:spLocks noGrp="1"/>
-          </p:cNvSpPr>
-          <p:nvPr>
-            <p:ph type="title"/>
-          </p:nvPr>
-        </p:nvSpPr>
-        <p:spPr>
-          <a:xfrm>
-            <a:off x="438913" y="859536"/>
-            <a:ext cx="4832802" cy="1170432"/>
-          </a:xfrm>
-        </p:spPr>
-        <p:txBody>
-          <a:bodyPr anchor="b">
-            <a:normAutofit/>
-          </a:bodyPr>
-          <a:lstStyle/>
-          <a:p>
-            <a:r>
-              <a:rPr lang="en-US" altLang="zh-TW" sz="3400" dirty="0"/>
-              <a:t>Q2: Intro</a:t>
-            </a:r>
-            <a:endParaRPr lang="zh-TW" altLang="en-US" sz="3400" dirty="0"/>
-          </a:p>
-        </p:txBody>
-      </p:sp>
-      <p:sp>
-        <p:nvSpPr>
-          <p:cNvPr id="19" name="Rectangle 18">
-            <a:extLst>
-              <a:ext uri="{FF2B5EF4-FFF2-40B4-BE49-F238E27FC236}">
-                <a16:creationId xmlns:a16="http://schemas.microsoft.com/office/drawing/2014/main" id="{FBEC5A7A-ADE4-48D9-B89C-2BA1C9110632}"/>
-              </a:ext>
-              <a:ext uri="{C183D7F6-B498-43B3-948B-1728B52AA6E4}">
-                <adec:decorative xmlns:adec="http://schemas.microsoft.com/office/drawing/2017/decorative" val="1"/>
-              </a:ext>
-            </a:extLst>
-          </p:cNvPr>
-          <p:cNvSpPr>
-            <a:spLocks noGrp="1" noRot="1" noChangeAspect="1" noMove="1" noResize="1" noEditPoints="1" noAdjustHandles="1" noChangeArrowheads="1" noChangeShapeType="1" noTextEdit="1"/>
-          </p:cNvSpPr>
-          <p:nvPr>
-            <p:extLst>
-              <p:ext uri="{386F3935-93C4-4BCD-93E2-E3B085C9AB24}">
-                <p16:designElem xmlns:p16="http://schemas.microsoft.com/office/powerpoint/2015/main" val="1"/>
-              </p:ext>
-            </p:extLst>
-          </p:nvPr>
-        </p:nvSpPr>
-        <p:spPr>
-          <a:xfrm rot="5400000">
-            <a:off x="703236" y="363389"/>
-            <a:ext cx="73152" cy="548640"/>
-          </a:xfrm>
-          <a:prstGeom prst="rect">
-            <a:avLst/>
-          </a:prstGeom>
-          <a:solidFill>
-            <a:schemeClr val="accent1"/>
-          </a:solidFill>
-          <a:ln>
-            <a:noFill/>
-          </a:ln>
-        </p:spPr>
-        <p:style>
-          <a:lnRef idx="2">
-            <a:schemeClr val="accent1">
-              <a:shade val="50000"/>
-            </a:schemeClr>
-          </a:lnRef>
-          <a:fillRef idx="1">
-            <a:schemeClr val="accent1"/>
-          </a:fillRef>
-          <a:effectRef idx="0">
-            <a:schemeClr val="accent1"/>
-          </a:effectRef>
-          <a:fontRef idx="minor">
-            <a:schemeClr val="lt1"/>
-          </a:fontRef>
-        </p:style>
-        <p:txBody>
-          <a:bodyPr rtlCol="0" anchor="ctr"/>
-          <a:lstStyle/>
-          <a:p>
-            <a:pPr marL="0" marR="0" lvl="0" indent="0" algn="ctr" defTabSz="914400" rtl="0" eaLnBrk="1" fontAlgn="auto" latinLnBrk="0" hangingPunct="1">
-              <a:lnSpc>
-                <a:spcPct val="100000"/>
-              </a:lnSpc>
-              <a:spcBef>
-                <a:spcPts val="0"/>
-              </a:spcBef>
-              <a:spcAft>
-                <a:spcPts val="0"/>
-              </a:spcAft>
-              <a:buClrTx/>
-              <a:buSzTx/>
-              <a:buFontTx/>
-              <a:buNone/>
-              <a:tabLst/>
-              <a:defRPr/>
-            </a:pPr>
-            <a:endParaRPr kumimoji="0" lang="en-US" sz="1800" b="0" i="0" u="none" strike="noStrike" kern="1200" cap="none" spc="0" normalizeH="0" baseline="0" noProof="0">
-              <a:ln>
-                <a:noFill/>
-              </a:ln>
-              <a:solidFill>
-                <a:prstClr val="white"/>
-              </a:solidFill>
-              <a:effectLst/>
-              <a:uLnTx/>
-              <a:uFillTx/>
-              <a:latin typeface="Calibri" panose="020F0502020204030204"/>
-              <a:ea typeface="+mn-ea"/>
-              <a:cs typeface="+mn-cs"/>
-            </a:endParaRPr>
-          </a:p>
-        </p:txBody>
-      </p:sp>
-      <p:sp>
-        <p:nvSpPr>
-          <p:cNvPr id="21" name="Rectangle 20">
-            <a:extLst>
-              <a:ext uri="{FF2B5EF4-FFF2-40B4-BE49-F238E27FC236}">
-                <a16:creationId xmlns:a16="http://schemas.microsoft.com/office/drawing/2014/main" id="{82095FCE-EF05-4443-B97A-85DEE3A5CA17}"/>
-              </a:ext>
-              <a:ext uri="{C183D7F6-B498-43B3-948B-1728B52AA6E4}">
-                <adec:decorative xmlns:adec="http://schemas.microsoft.com/office/drawing/2017/decorative" val="1"/>
-              </a:ext>
-            </a:extLst>
-          </p:cNvPr>
-          <p:cNvSpPr>
-            <a:spLocks noGrp="1" noRot="1" noChangeAspect="1" noMove="1" noResize="1" noEditPoints="1" noAdjustHandles="1" noChangeArrowheads="1" noChangeShapeType="1" noTextEdit="1"/>
-          </p:cNvSpPr>
-          <p:nvPr>
-            <p:extLst>
-              <p:ext uri="{386F3935-93C4-4BCD-93E2-E3B085C9AB24}">
-                <p16:designElem xmlns:p16="http://schemas.microsoft.com/office/powerpoint/2015/main" val="1"/>
-              </p:ext>
-            </p:extLst>
-          </p:nvPr>
-        </p:nvSpPr>
-        <p:spPr>
-          <a:xfrm>
-            <a:off x="465492" y="2185062"/>
-            <a:ext cx="4937760" cy="18288"/>
-          </a:xfrm>
-          <a:prstGeom prst="rect">
-            <a:avLst/>
-          </a:prstGeom>
-          <a:solidFill>
-            <a:schemeClr val="tx2">
-              <a:lumMod val="25000"/>
-              <a:lumOff val="75000"/>
-            </a:schemeClr>
-          </a:solidFill>
-          <a:ln w="3175">
-            <a:noFill/>
-          </a:ln>
-          <a:effectLst/>
-        </p:spPr>
-        <p:style>
-          <a:lnRef idx="2">
-            <a:schemeClr val="accent1">
-              <a:shade val="50000"/>
-            </a:schemeClr>
-          </a:lnRef>
-          <a:fillRef idx="1">
-            <a:schemeClr val="accent1"/>
-          </a:fillRef>
-          <a:effectRef idx="0">
-            <a:schemeClr val="accent1"/>
-          </a:effectRef>
-          <a:fontRef idx="minor">
-            <a:schemeClr val="lt1"/>
-          </a:fontRef>
-        </p:style>
-        <p:txBody>
-          <a:bodyPr rtlCol="0" anchor="ctr"/>
-          <a:lstStyle/>
-          <a:p>
-            <a:pPr marL="0" marR="0" lvl="0" indent="0" algn="ctr" defTabSz="914400" rtl="0" eaLnBrk="1" fontAlgn="auto" latinLnBrk="0" hangingPunct="1">
-              <a:lnSpc>
-                <a:spcPct val="100000"/>
-              </a:lnSpc>
-              <a:spcBef>
-                <a:spcPts val="0"/>
-              </a:spcBef>
-              <a:spcAft>
-                <a:spcPts val="0"/>
-              </a:spcAft>
-              <a:buClrTx/>
-              <a:buSzTx/>
-              <a:buFontTx/>
-              <a:buNone/>
-              <a:tabLst/>
-              <a:defRPr/>
-            </a:pPr>
-            <a:endParaRPr kumimoji="0" lang="en-US" sz="1800" b="0" i="0" u="none" strike="noStrike" kern="1200" cap="none" spc="0" normalizeH="0" baseline="0" noProof="0">
-              <a:ln>
-                <a:noFill/>
-              </a:ln>
-              <a:solidFill>
-                <a:prstClr val="white"/>
-              </a:solidFill>
-              <a:effectLst/>
-              <a:uLnTx/>
-              <a:uFillTx/>
-              <a:latin typeface="Calibri" panose="020F0502020204030204"/>
-              <a:ea typeface="+mn-ea"/>
-              <a:cs typeface="+mn-cs"/>
-            </a:endParaRPr>
-          </a:p>
-        </p:txBody>
-      </p:sp>
-      <p:sp>
-        <p:nvSpPr>
-          <p:cNvPr id="3" name="內容版面配置區 2">
-            <a:extLst>
-              <a:ext uri="{FF2B5EF4-FFF2-40B4-BE49-F238E27FC236}">
-                <a16:creationId xmlns:a16="http://schemas.microsoft.com/office/drawing/2014/main" id="{655153D6-7392-4190-A2AD-4AEF6E406272}"/>
-              </a:ext>
-            </a:extLst>
-          </p:cNvPr>
-          <p:cNvSpPr>
-            <a:spLocks noGrp="1"/>
-          </p:cNvSpPr>
-          <p:nvPr>
-            <p:ph idx="1"/>
-          </p:nvPr>
-        </p:nvSpPr>
-        <p:spPr>
-          <a:xfrm>
-            <a:off x="438912" y="2512611"/>
-            <a:ext cx="4832803" cy="3664351"/>
-          </a:xfrm>
-        </p:spPr>
-        <p:txBody>
-          <a:bodyPr>
-            <a:normAutofit/>
-          </a:bodyPr>
-          <a:lstStyle/>
-          <a:p>
-            <a:r>
-              <a:rPr lang="en-US" altLang="zh-TW" sz="1800" dirty="0"/>
-              <a:t>1 question = 1 trial</a:t>
-            </a:r>
-          </a:p>
-          <a:p>
-            <a:r>
-              <a:rPr lang="en-US" altLang="zh-TW" sz="1800" dirty="0"/>
-              <a:t>1 question type = 1 trial type (input type)</a:t>
-            </a:r>
-          </a:p>
-          <a:p>
-            <a:r>
-              <a:rPr lang="en-US" altLang="zh-TW" sz="1800" dirty="0"/>
-              <a:t>This question is a forced-choice task, so multiple choice is used</a:t>
-            </a:r>
-          </a:p>
-          <a:p>
-            <a:r>
-              <a:rPr lang="en-US" altLang="zh-TW" sz="1800" dirty="0"/>
-              <a:t>‘Force response’ = participants can’t skip the question</a:t>
-            </a:r>
-            <a:endParaRPr lang="zh-TW" altLang="en-US" sz="1800" dirty="0"/>
-          </a:p>
-        </p:txBody>
-      </p:sp>
-      <p:pic>
-        <p:nvPicPr>
-          <p:cNvPr id="6" name="圖片 5">
-            <a:extLst>
-              <a:ext uri="{FF2B5EF4-FFF2-40B4-BE49-F238E27FC236}">
-                <a16:creationId xmlns:a16="http://schemas.microsoft.com/office/drawing/2014/main" id="{37E83727-3629-45DE-8E75-F396E2948227}"/>
-              </a:ext>
-            </a:extLst>
-          </p:cNvPr>
-          <p:cNvPicPr>
-            <a:picLocks noChangeAspect="1"/>
-          </p:cNvPicPr>
-          <p:nvPr/>
-        </p:nvPicPr>
-        <p:blipFill>
-          <a:blip r:embed="rId2"/>
-          <a:stretch>
-            <a:fillRect/>
-          </a:stretch>
-        </p:blipFill>
-        <p:spPr>
-          <a:xfrm>
-            <a:off x="7120570" y="3149931"/>
-            <a:ext cx="3824264" cy="2743200"/>
-          </a:xfrm>
-          <a:prstGeom prst="rect">
-            <a:avLst/>
-          </a:prstGeom>
-        </p:spPr>
-      </p:pic>
-      <p:pic>
-        <p:nvPicPr>
-          <p:cNvPr id="8" name="圖片 7">
-            <a:extLst>
-              <a:ext uri="{FF2B5EF4-FFF2-40B4-BE49-F238E27FC236}">
-                <a16:creationId xmlns:a16="http://schemas.microsoft.com/office/drawing/2014/main" id="{844F8C7B-AFA5-49A5-A2A7-B6B01967ECF5}"/>
-              </a:ext>
-            </a:extLst>
-          </p:cNvPr>
-          <p:cNvPicPr>
-            <a:picLocks noChangeAspect="1"/>
-          </p:cNvPicPr>
-          <p:nvPr/>
-        </p:nvPicPr>
-        <p:blipFill>
-          <a:blip r:embed="rId3"/>
-          <a:stretch>
-            <a:fillRect/>
-          </a:stretch>
-        </p:blipFill>
-        <p:spPr>
-          <a:xfrm>
-            <a:off x="6463238" y="554738"/>
-            <a:ext cx="5138928" cy="2040456"/>
-          </a:xfrm>
-          <a:prstGeom prst="rect">
-            <a:avLst/>
-          </a:prstGeom>
-        </p:spPr>
-      </p:pic>
-    </p:spTree>
-    <p:extLst>
-      <p:ext uri="{BB962C8B-B14F-4D97-AF65-F5344CB8AC3E}">
-        <p14:creationId xmlns:p14="http://schemas.microsoft.com/office/powerpoint/2010/main" val="1911590532"/>
-      </p:ext>
-    </p:extLst>
-  </p:cSld>
-  <p:clrMapOvr>
-    <a:masterClrMapping/>
-  </p:clrMapOvr>
-</p:sld>
-</file>
-
-<file path=ppt/slides/slide11.xml><?xml version="1.0" encoding="utf-8"?>
-<p:sld xmlns:a="http://schemas.openxmlformats.org/drawingml/2006/main" xmlns:r="http://schemas.openxmlformats.org/officeDocument/2006/relationships" xmlns:p="http://schemas.openxmlformats.org/presentationml/2006/main">
-  <p:cSld>
     <p:bg>
       <p:bgPr>
         <a:gradFill>
@@ -9917,7 +9151,7 @@
 </p:sld>
 </file>
 
-<file path=ppt/slides/slide12.xml><?xml version="1.0" encoding="utf-8"?>
+<file path=ppt/slides/slide11.xml><?xml version="1.0" encoding="utf-8"?>
 <p:sld xmlns:a="http://schemas.openxmlformats.org/drawingml/2006/main" xmlns:r="http://schemas.openxmlformats.org/officeDocument/2006/relationships" xmlns:p="http://schemas.openxmlformats.org/presentationml/2006/main">
   <p:cSld>
     <p:bg>
@@ -10503,7 +9737,7 @@
 </p:sld>
 </file>
 
-<file path=ppt/slides/slide13.xml><?xml version="1.0" encoding="utf-8"?>
+<file path=ppt/slides/slide12.xml><?xml version="1.0" encoding="utf-8"?>
 <p:sld xmlns:a="http://schemas.openxmlformats.org/drawingml/2006/main" xmlns:r="http://schemas.openxmlformats.org/officeDocument/2006/relationships" xmlns:p="http://schemas.openxmlformats.org/presentationml/2006/main">
   <p:cSld>
     <p:bg>
@@ -10972,6 +10206,493 @@
 </p:sld>
 </file>
 
+<file path=ppt/slides/slide13.xml><?xml version="1.0" encoding="utf-8"?>
+<p:sld xmlns:a="http://schemas.openxmlformats.org/drawingml/2006/main" xmlns:r="http://schemas.openxmlformats.org/officeDocument/2006/relationships" xmlns:p="http://schemas.openxmlformats.org/presentationml/2006/main">
+  <p:cSld>
+    <p:spTree>
+      <p:nvGrpSpPr>
+        <p:cNvPr id="1" name=""/>
+        <p:cNvGrpSpPr/>
+        <p:nvPr/>
+      </p:nvGrpSpPr>
+      <p:grpSpPr>
+        <a:xfrm>
+          <a:off x="0" y="0"/>
+          <a:ext cx="0" cy="0"/>
+          <a:chOff x="0" y="0"/>
+          <a:chExt cx="0" cy="0"/>
+        </a:xfrm>
+      </p:grpSpPr>
+      <p:sp>
+        <p:nvSpPr>
+          <p:cNvPr id="2" name="標題 1">
+            <a:extLst>
+              <a:ext uri="{FF2B5EF4-FFF2-40B4-BE49-F238E27FC236}">
+                <a16:creationId xmlns:a16="http://schemas.microsoft.com/office/drawing/2014/main" id="{93048374-F638-4A45-B565-8E46C4C95AF1}"/>
+              </a:ext>
+            </a:extLst>
+          </p:cNvPr>
+          <p:cNvSpPr>
+            <a:spLocks noGrp="1"/>
+          </p:cNvSpPr>
+          <p:nvPr>
+            <p:ph type="title"/>
+          </p:nvPr>
+        </p:nvSpPr>
+        <p:spPr/>
+        <p:txBody>
+          <a:bodyPr/>
+          <a:lstStyle/>
+          <a:p>
+            <a:r>
+              <a:rPr lang="en-US" altLang="zh-TW" dirty="0"/>
+              <a:t>Q7mult</a:t>
+            </a:r>
+            <a:endParaRPr lang="zh-TW" altLang="en-US" dirty="0"/>
+          </a:p>
+        </p:txBody>
+      </p:sp>
+      <p:pic>
+        <p:nvPicPr>
+          <p:cNvPr id="5" name="圖片 4">
+            <a:extLst>
+              <a:ext uri="{FF2B5EF4-FFF2-40B4-BE49-F238E27FC236}">
+                <a16:creationId xmlns:a16="http://schemas.microsoft.com/office/drawing/2014/main" id="{954F83E8-2E87-4CCC-96D7-9E295CE1A34D}"/>
+              </a:ext>
+            </a:extLst>
+          </p:cNvPr>
+          <p:cNvPicPr>
+            <a:picLocks noChangeAspect="1"/>
+          </p:cNvPicPr>
+          <p:nvPr/>
+        </p:nvPicPr>
+        <p:blipFill>
+          <a:blip r:embed="rId2"/>
+          <a:stretch>
+            <a:fillRect/>
+          </a:stretch>
+        </p:blipFill>
+        <p:spPr>
+          <a:xfrm>
+            <a:off x="505969" y="1728216"/>
+            <a:ext cx="6515100" cy="1409700"/>
+          </a:xfrm>
+          <a:prstGeom prst="rect">
+            <a:avLst/>
+          </a:prstGeom>
+        </p:spPr>
+      </p:pic>
+      <p:pic>
+        <p:nvPicPr>
+          <p:cNvPr id="7" name="圖片 6">
+            <a:extLst>
+              <a:ext uri="{FF2B5EF4-FFF2-40B4-BE49-F238E27FC236}">
+                <a16:creationId xmlns:a16="http://schemas.microsoft.com/office/drawing/2014/main" id="{0FD5FE11-A3AF-4C08-A572-F1CB83473959}"/>
+              </a:ext>
+            </a:extLst>
+          </p:cNvPr>
+          <p:cNvPicPr>
+            <a:picLocks noChangeAspect="1"/>
+          </p:cNvPicPr>
+          <p:nvPr/>
+        </p:nvPicPr>
+        <p:blipFill>
+          <a:blip r:embed="rId3"/>
+          <a:stretch>
+            <a:fillRect/>
+          </a:stretch>
+        </p:blipFill>
+        <p:spPr>
+          <a:xfrm>
+            <a:off x="5410799" y="3220022"/>
+            <a:ext cx="6391275" cy="1000125"/>
+          </a:xfrm>
+          <a:prstGeom prst="rect">
+            <a:avLst/>
+          </a:prstGeom>
+        </p:spPr>
+      </p:pic>
+      <p:pic>
+        <p:nvPicPr>
+          <p:cNvPr id="9" name="圖片 8">
+            <a:extLst>
+              <a:ext uri="{FF2B5EF4-FFF2-40B4-BE49-F238E27FC236}">
+                <a16:creationId xmlns:a16="http://schemas.microsoft.com/office/drawing/2014/main" id="{1C5FA961-89E6-4A48-BDD9-63403D220677}"/>
+              </a:ext>
+            </a:extLst>
+          </p:cNvPr>
+          <p:cNvPicPr>
+            <a:picLocks noChangeAspect="1"/>
+          </p:cNvPicPr>
+          <p:nvPr/>
+        </p:nvPicPr>
+        <p:blipFill>
+          <a:blip r:embed="rId4"/>
+          <a:stretch>
+            <a:fillRect/>
+          </a:stretch>
+        </p:blipFill>
+        <p:spPr>
+          <a:xfrm>
+            <a:off x="681226" y="4469022"/>
+            <a:ext cx="5345979" cy="2222486"/>
+          </a:xfrm>
+          <a:prstGeom prst="rect">
+            <a:avLst/>
+          </a:prstGeom>
+        </p:spPr>
+      </p:pic>
+      <p:sp>
+        <p:nvSpPr>
+          <p:cNvPr id="11" name="矩形 10">
+            <a:extLst>
+              <a:ext uri="{FF2B5EF4-FFF2-40B4-BE49-F238E27FC236}">
+                <a16:creationId xmlns:a16="http://schemas.microsoft.com/office/drawing/2014/main" id="{FE0AF7D3-92A6-4030-AF4D-ADEC8C25468A}"/>
+              </a:ext>
+            </a:extLst>
+          </p:cNvPr>
+          <p:cNvSpPr/>
+          <p:nvPr/>
+        </p:nvSpPr>
+        <p:spPr>
+          <a:xfrm>
+            <a:off x="618309" y="1863634"/>
+            <a:ext cx="1280160" cy="409303"/>
+          </a:xfrm>
+          <a:prstGeom prst="rect">
+            <a:avLst/>
+          </a:prstGeom>
+          <a:noFill/>
+          <a:ln w="9525" cap="flat" cmpd="sng" algn="ctr">
+            <a:solidFill>
+              <a:schemeClr val="accent1"/>
+            </a:solidFill>
+            <a:prstDash val="solid"/>
+            <a:round/>
+            <a:headEnd type="none" w="med" len="med"/>
+            <a:tailEnd type="none" w="med" len="med"/>
+          </a:ln>
+        </p:spPr>
+        <p:style>
+          <a:lnRef idx="0">
+            <a:scrgbClr r="0" g="0" b="0"/>
+          </a:lnRef>
+          <a:fillRef idx="0">
+            <a:scrgbClr r="0" g="0" b="0"/>
+          </a:fillRef>
+          <a:effectRef idx="0">
+            <a:scrgbClr r="0" g="0" b="0"/>
+          </a:effectRef>
+          <a:fontRef idx="minor">
+            <a:schemeClr val="accent1"/>
+          </a:fontRef>
+        </p:style>
+        <p:txBody>
+          <a:bodyPr rtlCol="0" anchor="ctr"/>
+          <a:lstStyle/>
+          <a:p>
+            <a:pPr algn="ctr"/>
+            <a:endParaRPr lang="zh-TW" altLang="en-US"/>
+          </a:p>
+        </p:txBody>
+      </p:sp>
+      <p:pic>
+        <p:nvPicPr>
+          <p:cNvPr id="15" name="圖片 14">
+            <a:extLst>
+              <a:ext uri="{FF2B5EF4-FFF2-40B4-BE49-F238E27FC236}">
+                <a16:creationId xmlns:a16="http://schemas.microsoft.com/office/drawing/2014/main" id="{12C5724A-9FE6-4407-B5CB-8816B5A0BD09}"/>
+              </a:ext>
+            </a:extLst>
+          </p:cNvPr>
+          <p:cNvPicPr>
+            <a:picLocks noChangeAspect="1"/>
+          </p:cNvPicPr>
+          <p:nvPr/>
+        </p:nvPicPr>
+        <p:blipFill>
+          <a:blip r:embed="rId5"/>
+          <a:stretch>
+            <a:fillRect/>
+          </a:stretch>
+        </p:blipFill>
+        <p:spPr>
+          <a:xfrm>
+            <a:off x="7449149" y="4345344"/>
+            <a:ext cx="4352925" cy="2276475"/>
+          </a:xfrm>
+          <a:prstGeom prst="rect">
+            <a:avLst/>
+          </a:prstGeom>
+        </p:spPr>
+      </p:pic>
+      <p:sp>
+        <p:nvSpPr>
+          <p:cNvPr id="16" name="矩形 15">
+            <a:extLst>
+              <a:ext uri="{FF2B5EF4-FFF2-40B4-BE49-F238E27FC236}">
+                <a16:creationId xmlns:a16="http://schemas.microsoft.com/office/drawing/2014/main" id="{D750BE35-C3AD-43FC-A2DE-F11B0323EA6C}"/>
+              </a:ext>
+            </a:extLst>
+          </p:cNvPr>
+          <p:cNvSpPr/>
+          <p:nvPr/>
+        </p:nvSpPr>
+        <p:spPr>
+          <a:xfrm>
+            <a:off x="6027205" y="3429000"/>
+            <a:ext cx="208132" cy="219891"/>
+          </a:xfrm>
+          <a:prstGeom prst="rect">
+            <a:avLst/>
+          </a:prstGeom>
+          <a:noFill/>
+          <a:ln w="9525" cap="flat" cmpd="sng" algn="ctr">
+            <a:solidFill>
+              <a:schemeClr val="accent6"/>
+            </a:solidFill>
+            <a:prstDash val="solid"/>
+            <a:round/>
+            <a:headEnd type="none" w="med" len="med"/>
+            <a:tailEnd type="none" w="med" len="med"/>
+          </a:ln>
+        </p:spPr>
+        <p:style>
+          <a:lnRef idx="0">
+            <a:scrgbClr r="0" g="0" b="0"/>
+          </a:lnRef>
+          <a:fillRef idx="0">
+            <a:scrgbClr r="0" g="0" b="0"/>
+          </a:fillRef>
+          <a:effectRef idx="0">
+            <a:scrgbClr r="0" g="0" b="0"/>
+          </a:effectRef>
+          <a:fontRef idx="minor">
+            <a:schemeClr val="accent6"/>
+          </a:fontRef>
+        </p:style>
+        <p:txBody>
+          <a:bodyPr rtlCol="0" anchor="ctr"/>
+          <a:lstStyle/>
+          <a:p>
+            <a:pPr algn="ctr"/>
+            <a:endParaRPr lang="zh-TW" altLang="en-US"/>
+          </a:p>
+        </p:txBody>
+      </p:sp>
+      <p:sp>
+        <p:nvSpPr>
+          <p:cNvPr id="17" name="矩形 16">
+            <a:extLst>
+              <a:ext uri="{FF2B5EF4-FFF2-40B4-BE49-F238E27FC236}">
+                <a16:creationId xmlns:a16="http://schemas.microsoft.com/office/drawing/2014/main" id="{4E6C72C9-5FE7-4380-9910-BF86850AE977}"/>
+              </a:ext>
+            </a:extLst>
+          </p:cNvPr>
+          <p:cNvSpPr/>
+          <p:nvPr/>
+        </p:nvSpPr>
+        <p:spPr>
+          <a:xfrm>
+            <a:off x="6027205" y="3730997"/>
+            <a:ext cx="208132" cy="219891"/>
+          </a:xfrm>
+          <a:prstGeom prst="rect">
+            <a:avLst/>
+          </a:prstGeom>
+          <a:noFill/>
+          <a:ln w="9525" cap="flat" cmpd="sng" algn="ctr">
+            <a:solidFill>
+              <a:schemeClr val="accent6"/>
+            </a:solidFill>
+            <a:prstDash val="solid"/>
+            <a:round/>
+            <a:headEnd type="none" w="med" len="med"/>
+            <a:tailEnd type="none" w="med" len="med"/>
+          </a:ln>
+        </p:spPr>
+        <p:style>
+          <a:lnRef idx="0">
+            <a:scrgbClr r="0" g="0" b="0"/>
+          </a:lnRef>
+          <a:fillRef idx="0">
+            <a:scrgbClr r="0" g="0" b="0"/>
+          </a:fillRef>
+          <a:effectRef idx="0">
+            <a:scrgbClr r="0" g="0" b="0"/>
+          </a:effectRef>
+          <a:fontRef idx="minor">
+            <a:schemeClr val="accent6"/>
+          </a:fontRef>
+        </p:style>
+        <p:txBody>
+          <a:bodyPr rtlCol="0" anchor="ctr"/>
+          <a:lstStyle/>
+          <a:p>
+            <a:pPr algn="ctr"/>
+            <a:endParaRPr lang="zh-TW" altLang="en-US"/>
+          </a:p>
+        </p:txBody>
+      </p:sp>
+      <p:sp>
+        <p:nvSpPr>
+          <p:cNvPr id="18" name="箭號: 彎曲 17">
+            <a:extLst>
+              <a:ext uri="{FF2B5EF4-FFF2-40B4-BE49-F238E27FC236}">
+                <a16:creationId xmlns:a16="http://schemas.microsoft.com/office/drawing/2014/main" id="{E3F6B35D-69BE-4283-BFFB-6340659CB247}"/>
+              </a:ext>
+            </a:extLst>
+          </p:cNvPr>
+          <p:cNvSpPr/>
+          <p:nvPr/>
+        </p:nvSpPr>
+        <p:spPr>
+          <a:xfrm rot="5400000" flipV="1">
+            <a:off x="4067702" y="2602223"/>
+            <a:ext cx="1082230" cy="2651368"/>
+          </a:xfrm>
+          <a:prstGeom prst="bentArrow">
+            <a:avLst/>
+          </a:prstGeom>
+        </p:spPr>
+        <p:style>
+          <a:lnRef idx="2">
+            <a:schemeClr val="accent1">
+              <a:shade val="50000"/>
+            </a:schemeClr>
+          </a:lnRef>
+          <a:fillRef idx="1">
+            <a:schemeClr val="accent1"/>
+          </a:fillRef>
+          <a:effectRef idx="0">
+            <a:schemeClr val="accent1"/>
+          </a:effectRef>
+          <a:fontRef idx="minor">
+            <a:schemeClr val="lt1"/>
+          </a:fontRef>
+        </p:style>
+        <p:txBody>
+          <a:bodyPr rtlCol="0" anchor="ctr"/>
+          <a:lstStyle/>
+          <a:p>
+            <a:pPr algn="ctr"/>
+            <a:endParaRPr lang="zh-TW" altLang="en-US">
+              <a:solidFill>
+                <a:schemeClr val="tx1"/>
+              </a:solidFill>
+            </a:endParaRPr>
+          </a:p>
+        </p:txBody>
+      </p:sp>
+      <p:sp>
+        <p:nvSpPr>
+          <p:cNvPr id="19" name="箭號: 彎曲 18">
+            <a:extLst>
+              <a:ext uri="{FF2B5EF4-FFF2-40B4-BE49-F238E27FC236}">
+                <a16:creationId xmlns:a16="http://schemas.microsoft.com/office/drawing/2014/main" id="{27F46584-32AA-47DA-A225-3E9C5C4A1EE9}"/>
+              </a:ext>
+            </a:extLst>
+          </p:cNvPr>
+          <p:cNvSpPr/>
+          <p:nvPr/>
+        </p:nvSpPr>
+        <p:spPr>
+          <a:xfrm rot="5400000">
+            <a:off x="7524209" y="2540582"/>
+            <a:ext cx="1082230" cy="3359132"/>
+          </a:xfrm>
+          <a:prstGeom prst="bentArrow">
+            <a:avLst/>
+          </a:prstGeom>
+        </p:spPr>
+        <p:style>
+          <a:lnRef idx="2">
+            <a:schemeClr val="accent1">
+              <a:shade val="50000"/>
+            </a:schemeClr>
+          </a:lnRef>
+          <a:fillRef idx="1">
+            <a:schemeClr val="accent1"/>
+          </a:fillRef>
+          <a:effectRef idx="0">
+            <a:schemeClr val="accent1"/>
+          </a:effectRef>
+          <a:fontRef idx="minor">
+            <a:schemeClr val="lt1"/>
+          </a:fontRef>
+        </p:style>
+        <p:txBody>
+          <a:bodyPr rtlCol="0" anchor="ctr"/>
+          <a:lstStyle/>
+          <a:p>
+            <a:pPr algn="ctr"/>
+            <a:endParaRPr lang="zh-TW" altLang="en-US">
+              <a:solidFill>
+                <a:schemeClr val="tx1"/>
+              </a:solidFill>
+            </a:endParaRPr>
+          </a:p>
+        </p:txBody>
+      </p:sp>
+      <p:sp>
+        <p:nvSpPr>
+          <p:cNvPr id="20" name="箭號: 向右 19">
+            <a:extLst>
+              <a:ext uri="{FF2B5EF4-FFF2-40B4-BE49-F238E27FC236}">
+                <a16:creationId xmlns:a16="http://schemas.microsoft.com/office/drawing/2014/main" id="{CE056CF3-2EDF-4881-86F2-59F6972769B2}"/>
+              </a:ext>
+            </a:extLst>
+          </p:cNvPr>
+          <p:cNvSpPr/>
+          <p:nvPr/>
+        </p:nvSpPr>
+        <p:spPr>
+          <a:xfrm rot="1502318">
+            <a:off x="6737548" y="2677015"/>
+            <a:ext cx="1355217" cy="461554"/>
+          </a:xfrm>
+          <a:prstGeom prst="rightArrow">
+            <a:avLst/>
+          </a:prstGeom>
+        </p:spPr>
+        <p:style>
+          <a:lnRef idx="2">
+            <a:schemeClr val="accent1">
+              <a:shade val="50000"/>
+            </a:schemeClr>
+          </a:lnRef>
+          <a:fillRef idx="1">
+            <a:schemeClr val="accent1"/>
+          </a:fillRef>
+          <a:effectRef idx="0">
+            <a:schemeClr val="accent1"/>
+          </a:effectRef>
+          <a:fontRef idx="minor">
+            <a:schemeClr val="lt1"/>
+          </a:fontRef>
+        </p:style>
+        <p:txBody>
+          <a:bodyPr rtlCol="0" anchor="ctr"/>
+          <a:lstStyle/>
+          <a:p>
+            <a:pPr algn="ctr"/>
+            <a:endParaRPr lang="zh-TW" altLang="en-US"/>
+          </a:p>
+        </p:txBody>
+      </p:sp>
+    </p:spTree>
+    <p:extLst>
+      <p:ext uri="{BB962C8B-B14F-4D97-AF65-F5344CB8AC3E}">
+        <p14:creationId xmlns:p14="http://schemas.microsoft.com/office/powerpoint/2010/main" val="1041253391"/>
+      </p:ext>
+    </p:extLst>
+  </p:cSld>
+  <p:clrMapOvr>
+    <a:masterClrMapping/>
+  </p:clrMapOvr>
+</p:sld>
+</file>
+
 <file path=ppt/slides/slide14.xml><?xml version="1.0" encoding="utf-8"?>
 <p:sld xmlns:a="http://schemas.openxmlformats.org/drawingml/2006/main" xmlns:r="http://schemas.openxmlformats.org/officeDocument/2006/relationships" xmlns:p="http://schemas.openxmlformats.org/presentationml/2006/main">
   <p:cSld>
@@ -10989,41 +10710,12 @@
           <a:chExt cx="0" cy="0"/>
         </a:xfrm>
       </p:grpSpPr>
-      <p:sp>
-        <p:nvSpPr>
-          <p:cNvPr id="2" name="標題 1">
-            <a:extLst>
-              <a:ext uri="{FF2B5EF4-FFF2-40B4-BE49-F238E27FC236}">
-                <a16:creationId xmlns:a16="http://schemas.microsoft.com/office/drawing/2014/main" id="{93048374-F638-4A45-B565-8E46C4C95AF1}"/>
-              </a:ext>
-            </a:extLst>
-          </p:cNvPr>
-          <p:cNvSpPr>
-            <a:spLocks noGrp="1"/>
-          </p:cNvSpPr>
-          <p:nvPr>
-            <p:ph type="title"/>
-          </p:nvPr>
-        </p:nvSpPr>
-        <p:spPr/>
-        <p:txBody>
-          <a:bodyPr/>
-          <a:lstStyle/>
-          <a:p>
-            <a:r>
-              <a:rPr lang="en-US" altLang="zh-TW" dirty="0"/>
-              <a:t>Q8block</a:t>
-            </a:r>
-            <a:endParaRPr lang="zh-TW" altLang="en-US" dirty="0"/>
-          </a:p>
-        </p:txBody>
-      </p:sp>
       <p:pic>
         <p:nvPicPr>
-          <p:cNvPr id="5" name="圖片 4">
-            <a:extLst>
-              <a:ext uri="{FF2B5EF4-FFF2-40B4-BE49-F238E27FC236}">
-                <a16:creationId xmlns:a16="http://schemas.microsoft.com/office/drawing/2014/main" id="{954F83E8-2E87-4CCC-96D7-9E295CE1A34D}"/>
+          <p:cNvPr id="4" name="圖片 3">
+            <a:extLst>
+              <a:ext uri="{FF2B5EF4-FFF2-40B4-BE49-F238E27FC236}">
+                <a16:creationId xmlns:a16="http://schemas.microsoft.com/office/drawing/2014/main" id="{77F64525-FF37-4F00-B0A3-052EABA30D7C}"/>
               </a:ext>
             </a:extLst>
           </p:cNvPr>
@@ -11040,74 +10732,43 @@
         </p:blipFill>
         <p:spPr>
           <a:xfrm>
-            <a:off x="505969" y="1728216"/>
-            <a:ext cx="6515100" cy="1409700"/>
+            <a:off x="3190194" y="2068285"/>
+            <a:ext cx="4810125" cy="4362450"/>
           </a:xfrm>
           <a:prstGeom prst="rect">
             <a:avLst/>
           </a:prstGeom>
         </p:spPr>
       </p:pic>
-      <p:pic>
-        <p:nvPicPr>
-          <p:cNvPr id="7" name="圖片 6">
-            <a:extLst>
-              <a:ext uri="{FF2B5EF4-FFF2-40B4-BE49-F238E27FC236}">
-                <a16:creationId xmlns:a16="http://schemas.microsoft.com/office/drawing/2014/main" id="{0FD5FE11-A3AF-4C08-A572-F1CB83473959}"/>
-              </a:ext>
-            </a:extLst>
-          </p:cNvPr>
-          <p:cNvPicPr>
-            <a:picLocks noChangeAspect="1"/>
-          </p:cNvPicPr>
-          <p:nvPr/>
-        </p:nvPicPr>
-        <p:blipFill>
-          <a:blip r:embed="rId3"/>
-          <a:stretch>
-            <a:fillRect/>
-          </a:stretch>
-        </p:blipFill>
-        <p:spPr>
-          <a:xfrm>
-            <a:off x="5410799" y="3220022"/>
-            <a:ext cx="6391275" cy="1000125"/>
-          </a:xfrm>
-          <a:prstGeom prst="rect">
-            <a:avLst/>
-          </a:prstGeom>
-        </p:spPr>
-      </p:pic>
-      <p:pic>
-        <p:nvPicPr>
-          <p:cNvPr id="9" name="圖片 8">
-            <a:extLst>
-              <a:ext uri="{FF2B5EF4-FFF2-40B4-BE49-F238E27FC236}">
-                <a16:creationId xmlns:a16="http://schemas.microsoft.com/office/drawing/2014/main" id="{1C5FA961-89E6-4A48-BDD9-63403D220677}"/>
-              </a:ext>
-            </a:extLst>
-          </p:cNvPr>
-          <p:cNvPicPr>
-            <a:picLocks noChangeAspect="1"/>
-          </p:cNvPicPr>
-          <p:nvPr/>
-        </p:nvPicPr>
-        <p:blipFill>
-          <a:blip r:embed="rId4"/>
-          <a:stretch>
-            <a:fillRect/>
-          </a:stretch>
-        </p:blipFill>
-        <p:spPr>
-          <a:xfrm>
-            <a:off x="681226" y="4469022"/>
-            <a:ext cx="5345979" cy="2222486"/>
-          </a:xfrm>
-          <a:prstGeom prst="rect">
-            <a:avLst/>
-          </a:prstGeom>
-        </p:spPr>
-      </p:pic>
+      <p:sp>
+        <p:nvSpPr>
+          <p:cNvPr id="2" name="標題 1">
+            <a:extLst>
+              <a:ext uri="{FF2B5EF4-FFF2-40B4-BE49-F238E27FC236}">
+                <a16:creationId xmlns:a16="http://schemas.microsoft.com/office/drawing/2014/main" id="{93048374-F638-4A45-B565-8E46C4C95AF1}"/>
+              </a:ext>
+            </a:extLst>
+          </p:cNvPr>
+          <p:cNvSpPr>
+            <a:spLocks noGrp="1"/>
+          </p:cNvSpPr>
+          <p:nvPr>
+            <p:ph type="title"/>
+          </p:nvPr>
+        </p:nvSpPr>
+        <p:spPr/>
+        <p:txBody>
+          <a:bodyPr/>
+          <a:lstStyle/>
+          <a:p>
+            <a:r>
+              <a:rPr lang="en-US" altLang="zh-TW" dirty="0"/>
+              <a:t>Q8block</a:t>
+            </a:r>
+            <a:endParaRPr lang="zh-TW" altLang="en-US" dirty="0"/>
+          </a:p>
+        </p:txBody>
+      </p:sp>
       <p:sp>
         <p:nvSpPr>
           <p:cNvPr id="11" name="矩形 10">
@@ -11122,8 +10783,8 @@
         </p:nvSpPr>
         <p:spPr>
           <a:xfrm>
-            <a:off x="618309" y="1863634"/>
-            <a:ext cx="1280160" cy="409303"/>
+            <a:off x="5481174" y="5921831"/>
+            <a:ext cx="614826" cy="278674"/>
           </a:xfrm>
           <a:prstGeom prst="rect">
             <a:avLst/>
@@ -11162,294 +10823,10 @@
           </a:p>
         </p:txBody>
       </p:sp>
-      <p:pic>
-        <p:nvPicPr>
-          <p:cNvPr id="15" name="圖片 14">
-            <a:extLst>
-              <a:ext uri="{FF2B5EF4-FFF2-40B4-BE49-F238E27FC236}">
-                <a16:creationId xmlns:a16="http://schemas.microsoft.com/office/drawing/2014/main" id="{12C5724A-9FE6-4407-B5CB-8816B5A0BD09}"/>
-              </a:ext>
-            </a:extLst>
-          </p:cNvPr>
-          <p:cNvPicPr>
-            <a:picLocks noChangeAspect="1"/>
-          </p:cNvPicPr>
-          <p:nvPr/>
-        </p:nvPicPr>
-        <p:blipFill>
-          <a:blip r:embed="rId5"/>
-          <a:stretch>
-            <a:fillRect/>
-          </a:stretch>
-        </p:blipFill>
-        <p:spPr>
-          <a:xfrm>
-            <a:off x="7449149" y="4345344"/>
-            <a:ext cx="4352925" cy="2276475"/>
-          </a:xfrm>
-          <a:prstGeom prst="rect">
-            <a:avLst/>
-          </a:prstGeom>
-        </p:spPr>
-      </p:pic>
-      <p:sp>
-        <p:nvSpPr>
-          <p:cNvPr id="16" name="矩形 15">
-            <a:extLst>
-              <a:ext uri="{FF2B5EF4-FFF2-40B4-BE49-F238E27FC236}">
-                <a16:creationId xmlns:a16="http://schemas.microsoft.com/office/drawing/2014/main" id="{D750BE35-C3AD-43FC-A2DE-F11B0323EA6C}"/>
-              </a:ext>
-            </a:extLst>
-          </p:cNvPr>
-          <p:cNvSpPr/>
-          <p:nvPr/>
-        </p:nvSpPr>
-        <p:spPr>
-          <a:xfrm>
-            <a:off x="6027205" y="3429000"/>
-            <a:ext cx="208132" cy="219891"/>
-          </a:xfrm>
-          <a:prstGeom prst="rect">
-            <a:avLst/>
-          </a:prstGeom>
-          <a:noFill/>
-          <a:ln w="9525" cap="flat" cmpd="sng" algn="ctr">
-            <a:solidFill>
-              <a:schemeClr val="accent6"/>
-            </a:solidFill>
-            <a:prstDash val="solid"/>
-            <a:round/>
-            <a:headEnd type="none" w="med" len="med"/>
-            <a:tailEnd type="none" w="med" len="med"/>
-          </a:ln>
-        </p:spPr>
-        <p:style>
-          <a:lnRef idx="0">
-            <a:scrgbClr r="0" g="0" b="0"/>
-          </a:lnRef>
-          <a:fillRef idx="0">
-            <a:scrgbClr r="0" g="0" b="0"/>
-          </a:fillRef>
-          <a:effectRef idx="0">
-            <a:scrgbClr r="0" g="0" b="0"/>
-          </a:effectRef>
-          <a:fontRef idx="minor">
-            <a:schemeClr val="accent6"/>
-          </a:fontRef>
-        </p:style>
-        <p:txBody>
-          <a:bodyPr rtlCol="0" anchor="ctr"/>
-          <a:lstStyle/>
-          <a:p>
-            <a:pPr algn="ctr"/>
-            <a:endParaRPr lang="zh-TW" altLang="en-US"/>
-          </a:p>
-        </p:txBody>
-      </p:sp>
-      <p:sp>
-        <p:nvSpPr>
-          <p:cNvPr id="17" name="矩形 16">
-            <a:extLst>
-              <a:ext uri="{FF2B5EF4-FFF2-40B4-BE49-F238E27FC236}">
-                <a16:creationId xmlns:a16="http://schemas.microsoft.com/office/drawing/2014/main" id="{4E6C72C9-5FE7-4380-9910-BF86850AE977}"/>
-              </a:ext>
-            </a:extLst>
-          </p:cNvPr>
-          <p:cNvSpPr/>
-          <p:nvPr/>
-        </p:nvSpPr>
-        <p:spPr>
-          <a:xfrm>
-            <a:off x="6027205" y="3730997"/>
-            <a:ext cx="208132" cy="219891"/>
-          </a:xfrm>
-          <a:prstGeom prst="rect">
-            <a:avLst/>
-          </a:prstGeom>
-          <a:noFill/>
-          <a:ln w="9525" cap="flat" cmpd="sng" algn="ctr">
-            <a:solidFill>
-              <a:schemeClr val="accent6"/>
-            </a:solidFill>
-            <a:prstDash val="solid"/>
-            <a:round/>
-            <a:headEnd type="none" w="med" len="med"/>
-            <a:tailEnd type="none" w="med" len="med"/>
-          </a:ln>
-        </p:spPr>
-        <p:style>
-          <a:lnRef idx="0">
-            <a:scrgbClr r="0" g="0" b="0"/>
-          </a:lnRef>
-          <a:fillRef idx="0">
-            <a:scrgbClr r="0" g="0" b="0"/>
-          </a:fillRef>
-          <a:effectRef idx="0">
-            <a:scrgbClr r="0" g="0" b="0"/>
-          </a:effectRef>
-          <a:fontRef idx="minor">
-            <a:schemeClr val="accent6"/>
-          </a:fontRef>
-        </p:style>
-        <p:txBody>
-          <a:bodyPr rtlCol="0" anchor="ctr"/>
-          <a:lstStyle/>
-          <a:p>
-            <a:pPr algn="ctr"/>
-            <a:endParaRPr lang="zh-TW" altLang="en-US"/>
-          </a:p>
-        </p:txBody>
-      </p:sp>
-      <p:sp>
-        <p:nvSpPr>
-          <p:cNvPr id="18" name="箭號: 彎曲 17">
-            <a:extLst>
-              <a:ext uri="{FF2B5EF4-FFF2-40B4-BE49-F238E27FC236}">
-                <a16:creationId xmlns:a16="http://schemas.microsoft.com/office/drawing/2014/main" id="{E3F6B35D-69BE-4283-BFFB-6340659CB247}"/>
-              </a:ext>
-            </a:extLst>
-          </p:cNvPr>
-          <p:cNvSpPr/>
-          <p:nvPr/>
-        </p:nvSpPr>
-        <p:spPr>
-          <a:xfrm rot="5400000" flipV="1">
-            <a:off x="4067702" y="2602223"/>
-            <a:ext cx="1082230" cy="2651368"/>
-          </a:xfrm>
-          <a:prstGeom prst="bentArrow">
-            <a:avLst/>
-          </a:prstGeom>
-        </p:spPr>
-        <p:style>
-          <a:lnRef idx="2">
-            <a:schemeClr val="accent1">
-              <a:shade val="50000"/>
-            </a:schemeClr>
-          </a:lnRef>
-          <a:fillRef idx="1">
-            <a:schemeClr val="accent1"/>
-          </a:fillRef>
-          <a:effectRef idx="0">
-            <a:schemeClr val="accent1"/>
-          </a:effectRef>
-          <a:fontRef idx="minor">
-            <a:schemeClr val="lt1"/>
-          </a:fontRef>
-        </p:style>
-        <p:txBody>
-          <a:bodyPr rtlCol="0" anchor="ctr"/>
-          <a:lstStyle/>
-          <a:p>
-            <a:pPr algn="ctr"/>
-            <a:endParaRPr lang="zh-TW" altLang="en-US">
-              <a:solidFill>
-                <a:schemeClr val="tx1"/>
-              </a:solidFill>
-            </a:endParaRPr>
-          </a:p>
-        </p:txBody>
-      </p:sp>
-      <p:sp>
-        <p:nvSpPr>
-          <p:cNvPr id="19" name="箭號: 彎曲 18">
-            <a:extLst>
-              <a:ext uri="{FF2B5EF4-FFF2-40B4-BE49-F238E27FC236}">
-                <a16:creationId xmlns:a16="http://schemas.microsoft.com/office/drawing/2014/main" id="{27F46584-32AA-47DA-A225-3E9C5C4A1EE9}"/>
-              </a:ext>
-            </a:extLst>
-          </p:cNvPr>
-          <p:cNvSpPr/>
-          <p:nvPr/>
-        </p:nvSpPr>
-        <p:spPr>
-          <a:xfrm rot="5400000">
-            <a:off x="7524209" y="2540582"/>
-            <a:ext cx="1082230" cy="3359132"/>
-          </a:xfrm>
-          <a:prstGeom prst="bentArrow">
-            <a:avLst/>
-          </a:prstGeom>
-        </p:spPr>
-        <p:style>
-          <a:lnRef idx="2">
-            <a:schemeClr val="accent1">
-              <a:shade val="50000"/>
-            </a:schemeClr>
-          </a:lnRef>
-          <a:fillRef idx="1">
-            <a:schemeClr val="accent1"/>
-          </a:fillRef>
-          <a:effectRef idx="0">
-            <a:schemeClr val="accent1"/>
-          </a:effectRef>
-          <a:fontRef idx="minor">
-            <a:schemeClr val="lt1"/>
-          </a:fontRef>
-        </p:style>
-        <p:txBody>
-          <a:bodyPr rtlCol="0" anchor="ctr"/>
-          <a:lstStyle/>
-          <a:p>
-            <a:pPr algn="ctr"/>
-            <a:endParaRPr lang="zh-TW" altLang="en-US">
-              <a:solidFill>
-                <a:schemeClr val="tx1"/>
-              </a:solidFill>
-            </a:endParaRPr>
-          </a:p>
-        </p:txBody>
-      </p:sp>
-      <p:sp>
-        <p:nvSpPr>
-          <p:cNvPr id="20" name="箭號: 向右 19">
-            <a:extLst>
-              <a:ext uri="{FF2B5EF4-FFF2-40B4-BE49-F238E27FC236}">
-                <a16:creationId xmlns:a16="http://schemas.microsoft.com/office/drawing/2014/main" id="{CE056CF3-2EDF-4881-86F2-59F6972769B2}"/>
-              </a:ext>
-            </a:extLst>
-          </p:cNvPr>
-          <p:cNvSpPr/>
-          <p:nvPr/>
-        </p:nvSpPr>
-        <p:spPr>
-          <a:xfrm rot="1502318">
-            <a:off x="6737548" y="2677015"/>
-            <a:ext cx="1355217" cy="461554"/>
-          </a:xfrm>
-          <a:prstGeom prst="rightArrow">
-            <a:avLst/>
-          </a:prstGeom>
-        </p:spPr>
-        <p:style>
-          <a:lnRef idx="2">
-            <a:schemeClr val="accent1">
-              <a:shade val="50000"/>
-            </a:schemeClr>
-          </a:lnRef>
-          <a:fillRef idx="1">
-            <a:schemeClr val="accent1"/>
-          </a:fillRef>
-          <a:effectRef idx="0">
-            <a:schemeClr val="accent1"/>
-          </a:effectRef>
-          <a:fontRef idx="minor">
-            <a:schemeClr val="lt1"/>
-          </a:fontRef>
-        </p:style>
-        <p:txBody>
-          <a:bodyPr rtlCol="0" anchor="ctr"/>
-          <a:lstStyle/>
-          <a:p>
-            <a:pPr algn="ctr"/>
-            <a:endParaRPr lang="zh-TW" altLang="en-US"/>
-          </a:p>
-        </p:txBody>
-      </p:sp>
     </p:spTree>
     <p:extLst>
       <p:ext uri="{BB962C8B-B14F-4D97-AF65-F5344CB8AC3E}">
-        <p14:creationId xmlns:p14="http://schemas.microsoft.com/office/powerpoint/2010/main" val="1041253391"/>
+        <p14:creationId xmlns:p14="http://schemas.microsoft.com/office/powerpoint/2010/main" val="1469021"/>
       </p:ext>
     </p:extLst>
   </p:cSld>
@@ -12451,6 +11828,90 @@
               <a:t>Piped text</a:t>
             </a:r>
             <a:endParaRPr lang="zh-TW" altLang="en-US" dirty="0"/>
+          </a:p>
+        </p:txBody>
+      </p:sp>
+      <p:pic>
+        <p:nvPicPr>
+          <p:cNvPr id="5" name="圖片 4">
+            <a:extLst>
+              <a:ext uri="{FF2B5EF4-FFF2-40B4-BE49-F238E27FC236}">
+                <a16:creationId xmlns:a16="http://schemas.microsoft.com/office/drawing/2014/main" id="{0A362329-74D2-4688-B230-8C6F628D9461}"/>
+              </a:ext>
+            </a:extLst>
+          </p:cNvPr>
+          <p:cNvPicPr>
+            <a:picLocks noChangeAspect="1"/>
+          </p:cNvPicPr>
+          <p:nvPr/>
+        </p:nvPicPr>
+        <p:blipFill>
+          <a:blip r:embed="rId5"/>
+          <a:stretch>
+            <a:fillRect/>
+          </a:stretch>
+        </p:blipFill>
+        <p:spPr>
+          <a:xfrm>
+            <a:off x="1890362" y="90412"/>
+            <a:ext cx="8782050" cy="590550"/>
+          </a:xfrm>
+          <a:prstGeom prst="rect">
+            <a:avLst/>
+          </a:prstGeom>
+        </p:spPr>
+      </p:pic>
+      <p:sp>
+        <p:nvSpPr>
+          <p:cNvPr id="16" name="矩形 15">
+            <a:extLst>
+              <a:ext uri="{FF2B5EF4-FFF2-40B4-BE49-F238E27FC236}">
+                <a16:creationId xmlns:a16="http://schemas.microsoft.com/office/drawing/2014/main" id="{9DDC43C2-4668-4C5D-B730-DA733C8CC3EE}"/>
+              </a:ext>
+            </a:extLst>
+          </p:cNvPr>
+          <p:cNvSpPr/>
+          <p:nvPr/>
+        </p:nvSpPr>
+        <p:spPr>
+          <a:xfrm>
+            <a:off x="8269357" y="401379"/>
+            <a:ext cx="799250" cy="302774"/>
+          </a:xfrm>
+          <a:prstGeom prst="rect">
+            <a:avLst/>
+          </a:prstGeom>
+          <a:noFill/>
+          <a:ln w="9525" cap="flat" cmpd="sng" algn="ctr">
+            <a:solidFill>
+              <a:schemeClr val="dk1"/>
+            </a:solidFill>
+            <a:prstDash val="solid"/>
+            <a:round/>
+            <a:headEnd type="none" w="med" len="med"/>
+            <a:tailEnd type="none" w="med" len="med"/>
+          </a:ln>
+        </p:spPr>
+        <p:style>
+          <a:lnRef idx="0">
+            <a:scrgbClr r="0" g="0" b="0"/>
+          </a:lnRef>
+          <a:fillRef idx="0">
+            <a:scrgbClr r="0" g="0" b="0"/>
+          </a:fillRef>
+          <a:effectRef idx="0">
+            <a:scrgbClr r="0" g="0" b="0"/>
+          </a:effectRef>
+          <a:fontRef idx="minor">
+            <a:schemeClr val="dk1"/>
+          </a:fontRef>
+        </p:style>
+        <p:txBody>
+          <a:bodyPr rtlCol="0" anchor="ctr"/>
+          <a:lstStyle/>
+          <a:p>
+            <a:pPr algn="ctr"/>
+            <a:endParaRPr lang="zh-TW" altLang="en-US"/>
           </a:p>
         </p:txBody>
       </p:sp>
@@ -12917,6 +12378,36 @@
           </a:p>
         </p:txBody>
       </p:sp>
+      <p:pic>
+        <p:nvPicPr>
+          <p:cNvPr id="4" name="圖片 3">
+            <a:extLst>
+              <a:ext uri="{FF2B5EF4-FFF2-40B4-BE49-F238E27FC236}">
+                <a16:creationId xmlns:a16="http://schemas.microsoft.com/office/drawing/2014/main" id="{5C7473B5-0039-4403-84D8-2FA909701651}"/>
+              </a:ext>
+            </a:extLst>
+          </p:cNvPr>
+          <p:cNvPicPr>
+            <a:picLocks noChangeAspect="1"/>
+          </p:cNvPicPr>
+          <p:nvPr/>
+        </p:nvPicPr>
+        <p:blipFill>
+          <a:blip r:embed="rId2"/>
+          <a:stretch>
+            <a:fillRect/>
+          </a:stretch>
+        </p:blipFill>
+        <p:spPr>
+          <a:xfrm>
+            <a:off x="2652712" y="1762125"/>
+            <a:ext cx="6886575" cy="3333750"/>
+          </a:xfrm>
+          <a:prstGeom prst="rect">
+            <a:avLst/>
+          </a:prstGeom>
+        </p:spPr>
+      </p:pic>
     </p:spTree>
     <p:extLst>
       <p:ext uri="{BB962C8B-B14F-4D97-AF65-F5344CB8AC3E}">
@@ -19303,12 +18794,410 @@
           <a:chExt cx="0" cy="0"/>
         </a:xfrm>
       </p:grpSpPr>
+      <p:sp useBgFill="1">
+        <p:nvSpPr>
+          <p:cNvPr id="13" name="Rectangle 12">
+            <a:extLst>
+              <a:ext uri="{FF2B5EF4-FFF2-40B4-BE49-F238E27FC236}">
+                <a16:creationId xmlns:a16="http://schemas.microsoft.com/office/drawing/2014/main" id="{115719BB-48A7-4AF4-BB91-DC82E0DF727D}"/>
+              </a:ext>
+              <a:ext uri="{C183D7F6-B498-43B3-948B-1728B52AA6E4}">
+                <adec:decorative xmlns:adec="http://schemas.microsoft.com/office/drawing/2017/decorative" val="1"/>
+              </a:ext>
+            </a:extLst>
+          </p:cNvPr>
+          <p:cNvSpPr>
+            <a:spLocks noGrp="1" noRot="1" noChangeAspect="1" noMove="1" noResize="1" noEditPoints="1" noAdjustHandles="1" noChangeArrowheads="1" noChangeShapeType="1" noTextEdit="1"/>
+          </p:cNvSpPr>
+          <p:nvPr>
+            <p:extLst>
+              <p:ext uri="{386F3935-93C4-4BCD-93E2-E3B085C9AB24}">
+                <p16:designElem xmlns:p16="http://schemas.microsoft.com/office/powerpoint/2015/main" val="1"/>
+              </p:ext>
+            </p:extLst>
+          </p:nvPr>
+        </p:nvSpPr>
+        <p:spPr>
+          <a:xfrm>
+            <a:off x="0" y="0"/>
+            <a:ext cx="12192000" cy="6858000"/>
+          </a:xfrm>
+          <a:prstGeom prst="rect">
+            <a:avLst/>
+          </a:prstGeom>
+          <a:ln>
+            <a:noFill/>
+          </a:ln>
+        </p:spPr>
+        <p:style>
+          <a:lnRef idx="2">
+            <a:schemeClr val="accent1">
+              <a:shade val="50000"/>
+            </a:schemeClr>
+          </a:lnRef>
+          <a:fillRef idx="1">
+            <a:schemeClr val="accent1"/>
+          </a:fillRef>
+          <a:effectRef idx="0">
+            <a:schemeClr val="accent1"/>
+          </a:effectRef>
+          <a:fontRef idx="minor">
+            <a:schemeClr val="lt1"/>
+          </a:fontRef>
+        </p:style>
+        <p:txBody>
+          <a:bodyPr rtlCol="0" anchor="ctr"/>
+          <a:lstStyle/>
+          <a:p>
+            <a:pPr algn="ctr"/>
+            <a:endParaRPr lang="en-US"/>
+          </a:p>
+        </p:txBody>
+      </p:sp>
+      <p:sp useBgFill="1">
+        <p:nvSpPr>
+          <p:cNvPr id="15" name="Freeform: Shape 14">
+            <a:extLst>
+              <a:ext uri="{FF2B5EF4-FFF2-40B4-BE49-F238E27FC236}">
+                <a16:creationId xmlns:a16="http://schemas.microsoft.com/office/drawing/2014/main" id="{10973A55-5440-4A99-B526-B5812E46271E}"/>
+              </a:ext>
+              <a:ext uri="{C183D7F6-B498-43B3-948B-1728B52AA6E4}">
+                <adec:decorative xmlns:adec="http://schemas.microsoft.com/office/drawing/2017/decorative" val="1"/>
+              </a:ext>
+            </a:extLst>
+          </p:cNvPr>
+          <p:cNvSpPr>
+            <a:spLocks noGrp="1" noRot="1" noChangeAspect="1" noMove="1" noResize="1" noEditPoints="1" noAdjustHandles="1" noChangeArrowheads="1" noChangeShapeType="1" noTextEdit="1"/>
+          </p:cNvSpPr>
+          <p:nvPr>
+            <p:extLst>
+              <p:ext uri="{386F3935-93C4-4BCD-93E2-E3B085C9AB24}">
+                <p16:designElem xmlns:p16="http://schemas.microsoft.com/office/powerpoint/2015/main" val="1"/>
+              </p:ext>
+            </p:extLst>
+          </p:nvPr>
+        </p:nvSpPr>
+        <p:spPr>
+          <a:xfrm>
+            <a:off x="-1" y="0"/>
+            <a:ext cx="6096002" cy="6858000"/>
+          </a:xfrm>
+          <a:custGeom>
+            <a:avLst/>
+            <a:gdLst>
+              <a:gd name="connsiteX0" fmla="*/ 0 w 6096002"/>
+              <a:gd name="connsiteY0" fmla="*/ 0 h 6858000"/>
+              <a:gd name="connsiteX1" fmla="*/ 4885967 w 6096002"/>
+              <a:gd name="connsiteY1" fmla="*/ 0 h 6858000"/>
+              <a:gd name="connsiteX2" fmla="*/ 4946007 w 6096002"/>
+              <a:gd name="connsiteY2" fmla="*/ 69271 h 6858000"/>
+              <a:gd name="connsiteX3" fmla="*/ 6096002 w 6096002"/>
+              <a:gd name="connsiteY3" fmla="*/ 3429000 h 6858000"/>
+              <a:gd name="connsiteX4" fmla="*/ 4946007 w 6096002"/>
+              <a:gd name="connsiteY4" fmla="*/ 6788730 h 6858000"/>
+              <a:gd name="connsiteX5" fmla="*/ 4885967 w 6096002"/>
+              <a:gd name="connsiteY5" fmla="*/ 6858000 h 6858000"/>
+              <a:gd name="connsiteX6" fmla="*/ 0 w 6096002"/>
+              <a:gd name="connsiteY6" fmla="*/ 6858000 h 6858000"/>
+            </a:gdLst>
+            <a:ahLst/>
+            <a:cxnLst>
+              <a:cxn ang="0">
+                <a:pos x="connsiteX0" y="connsiteY0"/>
+              </a:cxn>
+              <a:cxn ang="0">
+                <a:pos x="connsiteX1" y="connsiteY1"/>
+              </a:cxn>
+              <a:cxn ang="0">
+                <a:pos x="connsiteX2" y="connsiteY2"/>
+              </a:cxn>
+              <a:cxn ang="0">
+                <a:pos x="connsiteX3" y="connsiteY3"/>
+              </a:cxn>
+              <a:cxn ang="0">
+                <a:pos x="connsiteX4" y="connsiteY4"/>
+              </a:cxn>
+              <a:cxn ang="0">
+                <a:pos x="connsiteX5" y="connsiteY5"/>
+              </a:cxn>
+              <a:cxn ang="0">
+                <a:pos x="connsiteX6" y="connsiteY6"/>
+              </a:cxn>
+            </a:cxnLst>
+            <a:rect l="l" t="t" r="r" b="b"/>
+            <a:pathLst>
+              <a:path w="6096002" h="6858000">
+                <a:moveTo>
+                  <a:pt x="0" y="0"/>
+                </a:moveTo>
+                <a:lnTo>
+                  <a:pt x="4885967" y="0"/>
+                </a:lnTo>
+                <a:lnTo>
+                  <a:pt x="4946007" y="69271"/>
+                </a:lnTo>
+                <a:cubicBezTo>
+                  <a:pt x="5656533" y="929100"/>
+                  <a:pt x="6096002" y="2116944"/>
+                  <a:pt x="6096002" y="3429000"/>
+                </a:cubicBezTo>
+                <a:cubicBezTo>
+                  <a:pt x="6096002" y="4741056"/>
+                  <a:pt x="5656533" y="5928900"/>
+                  <a:pt x="4946007" y="6788730"/>
+                </a:cubicBezTo>
+                <a:lnTo>
+                  <a:pt x="4885967" y="6858000"/>
+                </a:lnTo>
+                <a:lnTo>
+                  <a:pt x="0" y="6858000"/>
+                </a:lnTo>
+                <a:close/>
+              </a:path>
+            </a:pathLst>
+          </a:custGeom>
+          <a:ln w="9525">
+            <a:solidFill>
+              <a:schemeClr val="tx2">
+                <a:lumMod val="10000"/>
+                <a:lumOff val="90000"/>
+              </a:schemeClr>
+            </a:solidFill>
+          </a:ln>
+          <a:effectLst>
+            <a:outerShdw blurRad="50800" dist="38100" algn="l" rotWithShape="0">
+              <a:schemeClr val="bg1">
+                <a:lumMod val="85000"/>
+                <a:alpha val="30000"/>
+              </a:schemeClr>
+            </a:outerShdw>
+          </a:effectLst>
+        </p:spPr>
+        <p:style>
+          <a:lnRef idx="2">
+            <a:schemeClr val="accent1">
+              <a:shade val="50000"/>
+            </a:schemeClr>
+          </a:lnRef>
+          <a:fillRef idx="1">
+            <a:schemeClr val="accent1"/>
+          </a:fillRef>
+          <a:effectRef idx="0">
+            <a:schemeClr val="accent1"/>
+          </a:effectRef>
+          <a:fontRef idx="minor">
+            <a:schemeClr val="lt1"/>
+          </a:fontRef>
+        </p:style>
+        <p:txBody>
+          <a:bodyPr wrap="square" rtlCol="0" anchor="ctr">
+            <a:noAutofit/>
+          </a:bodyPr>
+          <a:lstStyle/>
+          <a:p>
+            <a:pPr marL="0" marR="0" lvl="0" indent="0" algn="ctr" defTabSz="914400" rtl="0" eaLnBrk="1" fontAlgn="auto" latinLnBrk="0" hangingPunct="1">
+              <a:lnSpc>
+                <a:spcPct val="100000"/>
+              </a:lnSpc>
+              <a:spcBef>
+                <a:spcPts val="0"/>
+              </a:spcBef>
+              <a:spcAft>
+                <a:spcPts val="0"/>
+              </a:spcAft>
+              <a:buClrTx/>
+              <a:buSzTx/>
+              <a:buFontTx/>
+              <a:buNone/>
+              <a:tabLst/>
+              <a:defRPr/>
+            </a:pPr>
+            <a:endParaRPr kumimoji="0" lang="en-US" sz="1800" b="0" i="0" u="none" strike="noStrike" kern="1200" cap="none" spc="0" normalizeH="0" baseline="0" noProof="0">
+              <a:ln>
+                <a:noFill/>
+              </a:ln>
+              <a:solidFill>
+                <a:prstClr val="white"/>
+              </a:solidFill>
+              <a:effectLst/>
+              <a:uLnTx/>
+              <a:uFillTx/>
+              <a:latin typeface="Calibri" panose="020F0502020204030204"/>
+              <a:ea typeface="+mn-ea"/>
+              <a:cs typeface="+mn-cs"/>
+            </a:endParaRPr>
+          </a:p>
+        </p:txBody>
+      </p:sp>
+      <p:sp useBgFill="1">
+        <p:nvSpPr>
+          <p:cNvPr id="17" name="Freeform: Shape 16">
+            <a:extLst>
+              <a:ext uri="{FF2B5EF4-FFF2-40B4-BE49-F238E27FC236}">
+                <a16:creationId xmlns:a16="http://schemas.microsoft.com/office/drawing/2014/main" id="{A9682493-588A-4D52-98F6-FBBD80C07ECB}"/>
+              </a:ext>
+              <a:ext uri="{C183D7F6-B498-43B3-948B-1728B52AA6E4}">
+                <adec:decorative xmlns:adec="http://schemas.microsoft.com/office/drawing/2017/decorative" val="1"/>
+              </a:ext>
+            </a:extLst>
+          </p:cNvPr>
+          <p:cNvSpPr>
+            <a:spLocks noGrp="1" noRot="1" noChangeAspect="1" noMove="1" noResize="1" noEditPoints="1" noAdjustHandles="1" noChangeArrowheads="1" noChangeShapeType="1" noTextEdit="1"/>
+          </p:cNvSpPr>
+          <p:nvPr>
+            <p:extLst>
+              <p:ext uri="{386F3935-93C4-4BCD-93E2-E3B085C9AB24}">
+                <p16:designElem xmlns:p16="http://schemas.microsoft.com/office/powerpoint/2015/main" val="1"/>
+              </p:ext>
+            </p:extLst>
+          </p:nvPr>
+        </p:nvSpPr>
+        <p:spPr>
+          <a:xfrm>
+            <a:off x="0" y="0"/>
+            <a:ext cx="6085370" cy="6858000"/>
+          </a:xfrm>
+          <a:custGeom>
+            <a:avLst/>
+            <a:gdLst>
+              <a:gd name="connsiteX0" fmla="*/ 0 w 6085370"/>
+              <a:gd name="connsiteY0" fmla="*/ 0 h 6858000"/>
+              <a:gd name="connsiteX1" fmla="*/ 4875335 w 6085370"/>
+              <a:gd name="connsiteY1" fmla="*/ 0 h 6858000"/>
+              <a:gd name="connsiteX2" fmla="*/ 4935375 w 6085370"/>
+              <a:gd name="connsiteY2" fmla="*/ 69271 h 6858000"/>
+              <a:gd name="connsiteX3" fmla="*/ 6085370 w 6085370"/>
+              <a:gd name="connsiteY3" fmla="*/ 3429000 h 6858000"/>
+              <a:gd name="connsiteX4" fmla="*/ 4935375 w 6085370"/>
+              <a:gd name="connsiteY4" fmla="*/ 6788730 h 6858000"/>
+              <a:gd name="connsiteX5" fmla="*/ 4875335 w 6085370"/>
+              <a:gd name="connsiteY5" fmla="*/ 6858000 h 6858000"/>
+              <a:gd name="connsiteX6" fmla="*/ 0 w 6085370"/>
+              <a:gd name="connsiteY6" fmla="*/ 6858000 h 6858000"/>
+            </a:gdLst>
+            <a:ahLst/>
+            <a:cxnLst>
+              <a:cxn ang="0">
+                <a:pos x="connsiteX0" y="connsiteY0"/>
+              </a:cxn>
+              <a:cxn ang="0">
+                <a:pos x="connsiteX1" y="connsiteY1"/>
+              </a:cxn>
+              <a:cxn ang="0">
+                <a:pos x="connsiteX2" y="connsiteY2"/>
+              </a:cxn>
+              <a:cxn ang="0">
+                <a:pos x="connsiteX3" y="connsiteY3"/>
+              </a:cxn>
+              <a:cxn ang="0">
+                <a:pos x="connsiteX4" y="connsiteY4"/>
+              </a:cxn>
+              <a:cxn ang="0">
+                <a:pos x="connsiteX5" y="connsiteY5"/>
+              </a:cxn>
+              <a:cxn ang="0">
+                <a:pos x="connsiteX6" y="connsiteY6"/>
+              </a:cxn>
+            </a:cxnLst>
+            <a:rect l="l" t="t" r="r" b="b"/>
+            <a:pathLst>
+              <a:path w="6085370" h="6858000">
+                <a:moveTo>
+                  <a:pt x="0" y="0"/>
+                </a:moveTo>
+                <a:lnTo>
+                  <a:pt x="4875335" y="0"/>
+                </a:lnTo>
+                <a:lnTo>
+                  <a:pt x="4935375" y="69271"/>
+                </a:lnTo>
+                <a:cubicBezTo>
+                  <a:pt x="5645901" y="929100"/>
+                  <a:pt x="6085370" y="2116944"/>
+                  <a:pt x="6085370" y="3429000"/>
+                </a:cubicBezTo>
+                <a:cubicBezTo>
+                  <a:pt x="6085370" y="4741056"/>
+                  <a:pt x="5645901" y="5928900"/>
+                  <a:pt x="4935375" y="6788730"/>
+                </a:cubicBezTo>
+                <a:lnTo>
+                  <a:pt x="4875335" y="6858000"/>
+                </a:lnTo>
+                <a:lnTo>
+                  <a:pt x="0" y="6858000"/>
+                </a:lnTo>
+                <a:close/>
+              </a:path>
+            </a:pathLst>
+          </a:custGeom>
+          <a:ln w="9525">
+            <a:noFill/>
+          </a:ln>
+          <a:effectLst/>
+        </p:spPr>
+        <p:style>
+          <a:lnRef idx="2">
+            <a:schemeClr val="accent1">
+              <a:shade val="50000"/>
+            </a:schemeClr>
+          </a:lnRef>
+          <a:fillRef idx="1">
+            <a:schemeClr val="accent1"/>
+          </a:fillRef>
+          <a:effectRef idx="0">
+            <a:schemeClr val="accent1"/>
+          </a:effectRef>
+          <a:fontRef idx="minor">
+            <a:schemeClr val="lt1"/>
+          </a:fontRef>
+        </p:style>
+        <p:txBody>
+          <a:bodyPr wrap="square" rtlCol="0" anchor="ctr">
+            <a:noAutofit/>
+          </a:bodyPr>
+          <a:lstStyle/>
+          <a:p>
+            <a:pPr marL="0" marR="0" lvl="0" indent="0" algn="ctr" defTabSz="914400" rtl="0" eaLnBrk="1" fontAlgn="auto" latinLnBrk="0" hangingPunct="1">
+              <a:lnSpc>
+                <a:spcPct val="100000"/>
+              </a:lnSpc>
+              <a:spcBef>
+                <a:spcPts val="0"/>
+              </a:spcBef>
+              <a:spcAft>
+                <a:spcPts val="0"/>
+              </a:spcAft>
+              <a:buClrTx/>
+              <a:buSzTx/>
+              <a:buFontTx/>
+              <a:buNone/>
+              <a:tabLst/>
+              <a:defRPr/>
+            </a:pPr>
+            <a:endParaRPr kumimoji="0" lang="en-US" sz="1800" b="0" i="0" u="none" strike="noStrike" kern="1200" cap="none" spc="0" normalizeH="0" baseline="0" noProof="0">
+              <a:ln>
+                <a:noFill/>
+              </a:ln>
+              <a:solidFill>
+                <a:prstClr val="white"/>
+              </a:solidFill>
+              <a:effectLst/>
+              <a:uLnTx/>
+              <a:uFillTx/>
+              <a:latin typeface="Calibri" panose="020F0502020204030204"/>
+              <a:ea typeface="+mn-ea"/>
+              <a:cs typeface="+mn-cs"/>
+            </a:endParaRPr>
+          </a:p>
+        </p:txBody>
+      </p:sp>
       <p:sp>
         <p:nvSpPr>
           <p:cNvPr id="2" name="標題 1">
             <a:extLst>
               <a:ext uri="{FF2B5EF4-FFF2-40B4-BE49-F238E27FC236}">
-                <a16:creationId xmlns:a16="http://schemas.microsoft.com/office/drawing/2014/main" id="{382BB73E-29D3-49EC-83C3-18224DC4D70E}"/>
+                <a16:creationId xmlns:a16="http://schemas.microsoft.com/office/drawing/2014/main" id="{3BB560C3-C9BD-4617-B54B-6E716152B1C4}"/>
               </a:ext>
             </a:extLst>
           </p:cNvPr>
@@ -19319,21 +19208,220 @@
             <p:ph type="title"/>
           </p:nvPr>
         </p:nvSpPr>
-        <p:spPr/>
-        <p:txBody>
-          <a:bodyPr/>
+        <p:spPr>
+          <a:xfrm>
+            <a:off x="438913" y="859536"/>
+            <a:ext cx="4832802" cy="1170432"/>
+          </a:xfrm>
+        </p:spPr>
+        <p:txBody>
+          <a:bodyPr anchor="b">
+            <a:normAutofit/>
+          </a:bodyPr>
           <a:lstStyle/>
           <a:p>
-            <a:endParaRPr lang="zh-HK" altLang="en-US" dirty="0"/>
+            <a:r>
+              <a:rPr lang="en-US" altLang="zh-TW" sz="3400" dirty="0"/>
+              <a:t>Q2: Intro</a:t>
+            </a:r>
+            <a:endParaRPr lang="zh-TW" altLang="en-US" sz="3400" dirty="0"/>
           </a:p>
         </p:txBody>
       </p:sp>
       <p:sp>
         <p:nvSpPr>
+          <p:cNvPr id="19" name="Rectangle 18">
+            <a:extLst>
+              <a:ext uri="{FF2B5EF4-FFF2-40B4-BE49-F238E27FC236}">
+                <a16:creationId xmlns:a16="http://schemas.microsoft.com/office/drawing/2014/main" id="{FBEC5A7A-ADE4-48D9-B89C-2BA1C9110632}"/>
+              </a:ext>
+              <a:ext uri="{C183D7F6-B498-43B3-948B-1728B52AA6E4}">
+                <adec:decorative xmlns:adec="http://schemas.microsoft.com/office/drawing/2017/decorative" val="1"/>
+              </a:ext>
+            </a:extLst>
+          </p:cNvPr>
+          <p:cNvSpPr>
+            <a:spLocks noGrp="1" noRot="1" noChangeAspect="1" noMove="1" noResize="1" noEditPoints="1" noAdjustHandles="1" noChangeArrowheads="1" noChangeShapeType="1" noTextEdit="1"/>
+          </p:cNvSpPr>
+          <p:nvPr>
+            <p:extLst>
+              <p:ext uri="{386F3935-93C4-4BCD-93E2-E3B085C9AB24}">
+                <p16:designElem xmlns:p16="http://schemas.microsoft.com/office/powerpoint/2015/main" val="1"/>
+              </p:ext>
+            </p:extLst>
+          </p:nvPr>
+        </p:nvSpPr>
+        <p:spPr>
+          <a:xfrm rot="5400000">
+            <a:off x="703236" y="363389"/>
+            <a:ext cx="73152" cy="548640"/>
+          </a:xfrm>
+          <a:prstGeom prst="rect">
+            <a:avLst/>
+          </a:prstGeom>
+          <a:solidFill>
+            <a:schemeClr val="accent1"/>
+          </a:solidFill>
+          <a:ln>
+            <a:noFill/>
+          </a:ln>
+        </p:spPr>
+        <p:style>
+          <a:lnRef idx="2">
+            <a:schemeClr val="accent1">
+              <a:shade val="50000"/>
+            </a:schemeClr>
+          </a:lnRef>
+          <a:fillRef idx="1">
+            <a:schemeClr val="accent1"/>
+          </a:fillRef>
+          <a:effectRef idx="0">
+            <a:schemeClr val="accent1"/>
+          </a:effectRef>
+          <a:fontRef idx="minor">
+            <a:schemeClr val="lt1"/>
+          </a:fontRef>
+        </p:style>
+        <p:txBody>
+          <a:bodyPr rtlCol="0" anchor="ctr"/>
+          <a:lstStyle/>
+          <a:p>
+            <a:pPr marL="0" marR="0" lvl="0" indent="0" algn="ctr" defTabSz="914400" rtl="0" eaLnBrk="1" fontAlgn="auto" latinLnBrk="0" hangingPunct="1">
+              <a:lnSpc>
+                <a:spcPct val="100000"/>
+              </a:lnSpc>
+              <a:spcBef>
+                <a:spcPts val="0"/>
+              </a:spcBef>
+              <a:spcAft>
+                <a:spcPts val="0"/>
+              </a:spcAft>
+              <a:buClrTx/>
+              <a:buSzTx/>
+              <a:buFontTx/>
+              <a:buNone/>
+              <a:tabLst/>
+              <a:defRPr/>
+            </a:pPr>
+            <a:endParaRPr kumimoji="0" lang="en-US" sz="1800" b="0" i="0" u="none" strike="noStrike" kern="1200" cap="none" spc="0" normalizeH="0" baseline="0" noProof="0">
+              <a:ln>
+                <a:noFill/>
+              </a:ln>
+              <a:solidFill>
+                <a:prstClr val="white"/>
+              </a:solidFill>
+              <a:effectLst/>
+              <a:uLnTx/>
+              <a:uFillTx/>
+              <a:latin typeface="Calibri" panose="020F0502020204030204"/>
+              <a:ea typeface="+mn-ea"/>
+              <a:cs typeface="+mn-cs"/>
+            </a:endParaRPr>
+          </a:p>
+        </p:txBody>
+      </p:sp>
+      <p:sp>
+        <p:nvSpPr>
+          <p:cNvPr id="21" name="Rectangle 20">
+            <a:extLst>
+              <a:ext uri="{FF2B5EF4-FFF2-40B4-BE49-F238E27FC236}">
+                <a16:creationId xmlns:a16="http://schemas.microsoft.com/office/drawing/2014/main" id="{82095FCE-EF05-4443-B97A-85DEE3A5CA17}"/>
+              </a:ext>
+              <a:ext uri="{C183D7F6-B498-43B3-948B-1728B52AA6E4}">
+                <adec:decorative xmlns:adec="http://schemas.microsoft.com/office/drawing/2017/decorative" val="1"/>
+              </a:ext>
+            </a:extLst>
+          </p:cNvPr>
+          <p:cNvSpPr>
+            <a:spLocks noGrp="1" noRot="1" noChangeAspect="1" noMove="1" noResize="1" noEditPoints="1" noAdjustHandles="1" noChangeArrowheads="1" noChangeShapeType="1" noTextEdit="1"/>
+          </p:cNvSpPr>
+          <p:nvPr>
+            <p:extLst>
+              <p:ext uri="{386F3935-93C4-4BCD-93E2-E3B085C9AB24}">
+                <p16:designElem xmlns:p16="http://schemas.microsoft.com/office/powerpoint/2015/main" val="1"/>
+              </p:ext>
+            </p:extLst>
+          </p:nvPr>
+        </p:nvSpPr>
+        <p:spPr>
+          <a:xfrm>
+            <a:off x="465492" y="2185062"/>
+            <a:ext cx="4937760" cy="18288"/>
+          </a:xfrm>
+          <a:prstGeom prst="rect">
+            <a:avLst/>
+          </a:prstGeom>
+          <a:solidFill>
+            <a:schemeClr val="tx2">
+              <a:lumMod val="25000"/>
+              <a:lumOff val="75000"/>
+            </a:schemeClr>
+          </a:solidFill>
+          <a:ln w="3175">
+            <a:noFill/>
+          </a:ln>
+          <a:effectLst/>
+        </p:spPr>
+        <p:style>
+          <a:lnRef idx="2">
+            <a:schemeClr val="accent1">
+              <a:shade val="50000"/>
+            </a:schemeClr>
+          </a:lnRef>
+          <a:fillRef idx="1">
+            <a:schemeClr val="accent1"/>
+          </a:fillRef>
+          <a:effectRef idx="0">
+            <a:schemeClr val="accent1"/>
+          </a:effectRef>
+          <a:fontRef idx="minor">
+            <a:schemeClr val="lt1"/>
+          </a:fontRef>
+        </p:style>
+        <p:txBody>
+          <a:bodyPr rtlCol="0" anchor="ctr"/>
+          <a:lstStyle/>
+          <a:p>
+            <a:pPr marL="0" marR="0" lvl="0" indent="0" algn="ctr" defTabSz="914400" rtl="0" eaLnBrk="1" fontAlgn="auto" latinLnBrk="0" hangingPunct="1">
+              <a:lnSpc>
+                <a:spcPct val="100000"/>
+              </a:lnSpc>
+              <a:spcBef>
+                <a:spcPts val="0"/>
+              </a:spcBef>
+              <a:spcAft>
+                <a:spcPts val="0"/>
+              </a:spcAft>
+              <a:buClrTx/>
+              <a:buSzTx/>
+              <a:buFontTx/>
+              <a:buNone/>
+              <a:tabLst/>
+              <a:defRPr/>
+            </a:pPr>
+            <a:endParaRPr kumimoji="0" lang="en-US" sz="1800" b="0" i="0" u="none" strike="noStrike" kern="1200" cap="none" spc="0" normalizeH="0" baseline="0" noProof="0">
+              <a:ln>
+                <a:noFill/>
+              </a:ln>
+              <a:solidFill>
+                <a:prstClr val="white"/>
+              </a:solidFill>
+              <a:effectLst/>
+              <a:uLnTx/>
+              <a:uFillTx/>
+              <a:latin typeface="Calibri" panose="020F0502020204030204"/>
+              <a:ea typeface="+mn-ea"/>
+              <a:cs typeface="+mn-cs"/>
+            </a:endParaRPr>
+          </a:p>
+        </p:txBody>
+      </p:sp>
+      <p:sp>
+        <p:nvSpPr>
           <p:cNvPr id="3" name="內容版面配置區 2">
             <a:extLst>
               <a:ext uri="{FF2B5EF4-FFF2-40B4-BE49-F238E27FC236}">
-                <a16:creationId xmlns:a16="http://schemas.microsoft.com/office/drawing/2014/main" id="{F75E2BC0-B1B9-49ED-B5D5-093E19A82337}"/>
+                <a16:creationId xmlns:a16="http://schemas.microsoft.com/office/drawing/2014/main" id="{655153D6-7392-4190-A2AD-4AEF6E406272}"/>
               </a:ext>
             </a:extLst>
           </p:cNvPr>
@@ -19344,19 +19432,108 @@
             <p:ph idx="1"/>
           </p:nvPr>
         </p:nvSpPr>
-        <p:spPr/>
-        <p:txBody>
-          <a:bodyPr/>
+        <p:spPr>
+          <a:xfrm>
+            <a:off x="438912" y="2512611"/>
+            <a:ext cx="4832803" cy="3664351"/>
+          </a:xfrm>
+        </p:spPr>
+        <p:txBody>
+          <a:bodyPr>
+            <a:normAutofit/>
+          </a:bodyPr>
           <a:lstStyle/>
           <a:p>
-            <a:endParaRPr lang="zh-HK" altLang="en-US"/>
-          </a:p>
-        </p:txBody>
-      </p:sp>
+            <a:r>
+              <a:rPr lang="en-US" altLang="zh-TW" sz="1800" dirty="0"/>
+              <a:t>1 question = 1 trial</a:t>
+            </a:r>
+          </a:p>
+          <a:p>
+            <a:r>
+              <a:rPr lang="en-US" altLang="zh-TW" sz="1800" dirty="0"/>
+              <a:t>1 question type = 1 trial type (input type)</a:t>
+            </a:r>
+          </a:p>
+          <a:p>
+            <a:r>
+              <a:rPr lang="en-US" altLang="zh-TW" sz="1800" dirty="0"/>
+              <a:t>This question is a forced-choice task, so multiple choice is used</a:t>
+            </a:r>
+          </a:p>
+          <a:p>
+            <a:r>
+              <a:rPr lang="en-US" altLang="zh-TW" sz="1800" dirty="0"/>
+              <a:t>‘Force response’ = participants can’t skip the question</a:t>
+            </a:r>
+            <a:endParaRPr lang="zh-TW" altLang="en-US" sz="1800" dirty="0"/>
+          </a:p>
+        </p:txBody>
+      </p:sp>
+      <p:pic>
+        <p:nvPicPr>
+          <p:cNvPr id="6" name="圖片 5">
+            <a:extLst>
+              <a:ext uri="{FF2B5EF4-FFF2-40B4-BE49-F238E27FC236}">
+                <a16:creationId xmlns:a16="http://schemas.microsoft.com/office/drawing/2014/main" id="{37E83727-3629-45DE-8E75-F396E2948227}"/>
+              </a:ext>
+            </a:extLst>
+          </p:cNvPr>
+          <p:cNvPicPr>
+            <a:picLocks noChangeAspect="1"/>
+          </p:cNvPicPr>
+          <p:nvPr/>
+        </p:nvPicPr>
+        <p:blipFill>
+          <a:blip r:embed="rId2"/>
+          <a:stretch>
+            <a:fillRect/>
+          </a:stretch>
+        </p:blipFill>
+        <p:spPr>
+          <a:xfrm>
+            <a:off x="7120570" y="3149931"/>
+            <a:ext cx="3824264" cy="2743200"/>
+          </a:xfrm>
+          <a:prstGeom prst="rect">
+            <a:avLst/>
+          </a:prstGeom>
+        </p:spPr>
+      </p:pic>
+      <p:pic>
+        <p:nvPicPr>
+          <p:cNvPr id="8" name="圖片 7">
+            <a:extLst>
+              <a:ext uri="{FF2B5EF4-FFF2-40B4-BE49-F238E27FC236}">
+                <a16:creationId xmlns:a16="http://schemas.microsoft.com/office/drawing/2014/main" id="{844F8C7B-AFA5-49A5-A2A7-B6B01967ECF5}"/>
+              </a:ext>
+            </a:extLst>
+          </p:cNvPr>
+          <p:cNvPicPr>
+            <a:picLocks noChangeAspect="1"/>
+          </p:cNvPicPr>
+          <p:nvPr/>
+        </p:nvPicPr>
+        <p:blipFill>
+          <a:blip r:embed="rId3"/>
+          <a:stretch>
+            <a:fillRect/>
+          </a:stretch>
+        </p:blipFill>
+        <p:spPr>
+          <a:xfrm>
+            <a:off x="6463238" y="554738"/>
+            <a:ext cx="5138928" cy="2040456"/>
+          </a:xfrm>
+          <a:prstGeom prst="rect">
+            <a:avLst/>
+          </a:prstGeom>
+        </p:spPr>
+      </p:pic>
     </p:spTree>
     <p:extLst>
       <p:ext uri="{BB962C8B-B14F-4D97-AF65-F5344CB8AC3E}">
-        <p14:creationId xmlns:p14="http://schemas.microsoft.com/office/powerpoint/2010/main" val="2335066798"/>
+        <p14:creationId xmlns:p14="http://schemas.microsoft.com/office/powerpoint/2010/main" val="1911590532"/>
       </p:ext>
     </p:extLst>
   </p:cSld>

</xml_diff>